<commit_message>
Files for DIP Phase 1
</commit_message>
<xml_diff>
--- a/DIP_Phase_1_Lab_Manuals/AT Commands of HC-06.pptx
+++ b/DIP_Phase_1_Lab_Manuals/AT Commands of HC-06.pptx
@@ -120,3159 +120,6 @@
 <p1510:revInfo xmlns:a="http://schemas.openxmlformats.org/drawingml/2006/main" xmlns:r="http://schemas.openxmlformats.org/officeDocument/2006/relationships" xmlns:p1510="http://schemas.microsoft.com/office/powerpoint/2015/10/main"/>
 </file>
 
-<file path=ppt/diagrams/colors1.xml><?xml version="1.0" encoding="utf-8"?>
-<dgm:colorsDef xmlns:dgm="http://schemas.openxmlformats.org/drawingml/2006/diagram" xmlns:a="http://schemas.openxmlformats.org/drawingml/2006/main" uniqueId="urn:microsoft.com/office/officeart/2005/8/colors/ColorSchemeForSuggestions">
-  <dgm:title val="Color Scheme for Suggestions"/>
-  <dgm:desc val="Color Scheme for Suggestions"/>
-  <dgm:catLst>
-    <dgm:cat type="Other" pri="2"/>
-  </dgm:catLst>
-  <dgm:styleLbl name="node0">
-    <dgm:fillClrLst meth="repeat">
-      <a:schemeClr val="accent1"/>
-    </dgm:fillClrLst>
-    <dgm:linClrLst meth="repeat">
-      <a:schemeClr val="lt1"/>
-    </dgm:linClrLst>
-    <dgm:effectClrLst/>
-    <dgm:txLinClrLst/>
-    <dgm:txFillClrLst/>
-    <dgm:txEffectClrLst/>
-  </dgm:styleLbl>
-  <dgm:styleLbl name="alignNode1">
-    <dgm:fillClrLst meth="repeat">
-      <a:schemeClr val="accent1"/>
-    </dgm:fillClrLst>
-    <dgm:linClrLst meth="repeat">
-      <a:schemeClr val="accent1"/>
-    </dgm:linClrLst>
-    <dgm:effectClrLst/>
-    <dgm:txLinClrLst/>
-    <dgm:txFillClrLst/>
-    <dgm:txEffectClrLst/>
-  </dgm:styleLbl>
-  <dgm:styleLbl name="node1">
-    <dgm:fillClrLst meth="repeat">
-      <a:schemeClr val="accent1"/>
-    </dgm:fillClrLst>
-    <dgm:linClrLst meth="repeat">
-      <a:schemeClr val="lt1"/>
-    </dgm:linClrLst>
-    <dgm:effectClrLst/>
-    <dgm:txLinClrLst/>
-    <dgm:txFillClrLst/>
-    <dgm:txEffectClrLst/>
-  </dgm:styleLbl>
-  <dgm:styleLbl name="lnNode1">
-    <dgm:fillClrLst meth="repeat">
-      <a:schemeClr val="accent1"/>
-    </dgm:fillClrLst>
-    <dgm:linClrLst meth="repeat">
-      <a:schemeClr val="lt1"/>
-    </dgm:linClrLst>
-    <dgm:effectClrLst/>
-    <dgm:txLinClrLst/>
-    <dgm:txFillClrLst/>
-    <dgm:txEffectClrLst/>
-  </dgm:styleLbl>
-  <dgm:styleLbl name="vennNode1">
-    <dgm:fillClrLst meth="repeat">
-      <a:schemeClr val="accent1">
-        <a:alpha val="50000"/>
-      </a:schemeClr>
-    </dgm:fillClrLst>
-    <dgm:linClrLst meth="repeat">
-      <a:schemeClr val="lt1"/>
-    </dgm:linClrLst>
-    <dgm:effectClrLst/>
-    <dgm:txLinClrLst/>
-    <dgm:txFillClrLst/>
-    <dgm:txEffectClrLst/>
-  </dgm:styleLbl>
-  <dgm:styleLbl name="node2">
-    <dgm:fillClrLst meth="repeat">
-      <a:schemeClr val="accent1"/>
-    </dgm:fillClrLst>
-    <dgm:linClrLst meth="repeat">
-      <a:schemeClr val="lt1"/>
-    </dgm:linClrLst>
-    <dgm:effectClrLst/>
-    <dgm:txLinClrLst/>
-    <dgm:txFillClrLst/>
-    <dgm:txEffectClrLst/>
-  </dgm:styleLbl>
-  <dgm:styleLbl name="node3">
-    <dgm:fillClrLst meth="repeat">
-      <a:schemeClr val="accent1"/>
-    </dgm:fillClrLst>
-    <dgm:linClrLst meth="repeat">
-      <a:schemeClr val="lt1"/>
-    </dgm:linClrLst>
-    <dgm:effectClrLst/>
-    <dgm:txLinClrLst/>
-    <dgm:txFillClrLst/>
-    <dgm:txEffectClrLst/>
-  </dgm:styleLbl>
-  <dgm:styleLbl name="node4">
-    <dgm:fillClrLst meth="repeat">
-      <a:schemeClr val="accent1"/>
-    </dgm:fillClrLst>
-    <dgm:linClrLst meth="repeat">
-      <a:schemeClr val="lt1"/>
-    </dgm:linClrLst>
-    <dgm:effectClrLst/>
-    <dgm:txLinClrLst/>
-    <dgm:txFillClrLst/>
-    <dgm:txEffectClrLst/>
-  </dgm:styleLbl>
-  <dgm:styleLbl name="fgImgPlace1">
-    <dgm:fillClrLst meth="repeat">
-      <a:schemeClr val="accent1">
-        <a:tint val="50000"/>
-      </a:schemeClr>
-    </dgm:fillClrLst>
-    <dgm:linClrLst meth="repeat">
-      <a:schemeClr val="lt1"/>
-    </dgm:linClrLst>
-    <dgm:effectClrLst/>
-    <dgm:txLinClrLst/>
-    <dgm:txFillClrLst meth="repeat">
-      <a:schemeClr val="lt1"/>
-    </dgm:txFillClrLst>
-    <dgm:txEffectClrLst/>
-  </dgm:styleLbl>
-  <dgm:styleLbl name="alignImgPlace1">
-    <dgm:fillClrLst meth="repeat">
-      <a:schemeClr val="accent1">
-        <a:tint val="50000"/>
-      </a:schemeClr>
-    </dgm:fillClrLst>
-    <dgm:linClrLst meth="repeat">
-      <a:schemeClr val="lt1"/>
-    </dgm:linClrLst>
-    <dgm:effectClrLst/>
-    <dgm:txLinClrLst/>
-    <dgm:txFillClrLst meth="repeat">
-      <a:schemeClr val="lt1"/>
-    </dgm:txFillClrLst>
-    <dgm:txEffectClrLst/>
-  </dgm:styleLbl>
-  <dgm:styleLbl name="bgImgPlace1">
-    <dgm:fillClrLst meth="repeat">
-      <a:schemeClr val="accent1">
-        <a:tint val="50000"/>
-      </a:schemeClr>
-    </dgm:fillClrLst>
-    <dgm:linClrLst meth="repeat">
-      <a:schemeClr val="lt1"/>
-    </dgm:linClrLst>
-    <dgm:effectClrLst/>
-    <dgm:txLinClrLst/>
-    <dgm:txFillClrLst meth="repeat">
-      <a:schemeClr val="lt1"/>
-    </dgm:txFillClrLst>
-    <dgm:txEffectClrLst/>
-  </dgm:styleLbl>
-  <dgm:styleLbl name="sibTrans2D1">
-    <dgm:fillClrLst meth="repeat">
-      <a:schemeClr val="accent1">
-        <a:tint val="60000"/>
-      </a:schemeClr>
-    </dgm:fillClrLst>
-    <dgm:linClrLst meth="repeat">
-      <a:schemeClr val="accent1">
-        <a:tint val="60000"/>
-      </a:schemeClr>
-    </dgm:linClrLst>
-    <dgm:effectClrLst/>
-    <dgm:txLinClrLst/>
-    <dgm:txFillClrLst/>
-    <dgm:txEffectClrLst/>
-  </dgm:styleLbl>
-  <dgm:styleLbl name="fgSibTrans2D1">
-    <dgm:fillClrLst meth="repeat">
-      <a:schemeClr val="accent1">
-        <a:tint val="60000"/>
-      </a:schemeClr>
-    </dgm:fillClrLst>
-    <dgm:linClrLst meth="repeat">
-      <a:schemeClr val="accent1">
-        <a:tint val="60000"/>
-      </a:schemeClr>
-    </dgm:linClrLst>
-    <dgm:effectClrLst/>
-    <dgm:txLinClrLst/>
-    <dgm:txFillClrLst/>
-    <dgm:txEffectClrLst/>
-  </dgm:styleLbl>
-  <dgm:styleLbl name="bgSibTrans2D1">
-    <dgm:fillClrLst meth="repeat">
-      <a:schemeClr val="accent1">
-        <a:tint val="60000"/>
-      </a:schemeClr>
-    </dgm:fillClrLst>
-    <dgm:linClrLst meth="repeat">
-      <a:schemeClr val="accent1">
-        <a:tint val="60000"/>
-      </a:schemeClr>
-    </dgm:linClrLst>
-    <dgm:effectClrLst/>
-    <dgm:txLinClrLst/>
-    <dgm:txFillClrLst/>
-    <dgm:txEffectClrLst/>
-  </dgm:styleLbl>
-  <dgm:styleLbl name="sibTrans1D1">
-    <dgm:fillClrLst meth="repeat">
-      <a:schemeClr val="accent1"/>
-    </dgm:fillClrLst>
-    <dgm:linClrLst meth="repeat">
-      <a:schemeClr val="accent1"/>
-    </dgm:linClrLst>
-    <dgm:effectClrLst/>
-    <dgm:txLinClrLst/>
-    <dgm:txFillClrLst meth="repeat">
-      <a:schemeClr val="tx1"/>
-    </dgm:txFillClrLst>
-    <dgm:txEffectClrLst/>
-  </dgm:styleLbl>
-  <dgm:styleLbl name="callout">
-    <dgm:fillClrLst meth="repeat">
-      <a:schemeClr val="accent1"/>
-    </dgm:fillClrLst>
-    <dgm:linClrLst meth="repeat">
-      <a:schemeClr val="accent1">
-        <a:tint val="50000"/>
-      </a:schemeClr>
-    </dgm:linClrLst>
-    <dgm:effectClrLst/>
-    <dgm:txLinClrLst/>
-    <dgm:txFillClrLst meth="repeat">
-      <a:schemeClr val="tx1"/>
-    </dgm:txFillClrLst>
-    <dgm:txEffectClrLst/>
-  </dgm:styleLbl>
-  <dgm:styleLbl name="asst0">
-    <dgm:fillClrLst meth="repeat">
-      <a:schemeClr val="accent1"/>
-    </dgm:fillClrLst>
-    <dgm:linClrLst meth="repeat">
-      <a:schemeClr val="lt1"/>
-    </dgm:linClrLst>
-    <dgm:effectClrLst/>
-    <dgm:txLinClrLst/>
-    <dgm:txFillClrLst/>
-    <dgm:txEffectClrLst/>
-  </dgm:styleLbl>
-  <dgm:styleLbl name="asst1">
-    <dgm:fillClrLst meth="repeat">
-      <a:schemeClr val="accent1"/>
-    </dgm:fillClrLst>
-    <dgm:linClrLst meth="repeat">
-      <a:schemeClr val="lt1"/>
-    </dgm:linClrLst>
-    <dgm:effectClrLst/>
-    <dgm:txLinClrLst/>
-    <dgm:txFillClrLst/>
-    <dgm:txEffectClrLst/>
-  </dgm:styleLbl>
-  <dgm:styleLbl name="asst2">
-    <dgm:fillClrLst meth="repeat">
-      <a:schemeClr val="accent1"/>
-    </dgm:fillClrLst>
-    <dgm:linClrLst meth="repeat">
-      <a:schemeClr val="lt1"/>
-    </dgm:linClrLst>
-    <dgm:effectClrLst/>
-    <dgm:txLinClrLst/>
-    <dgm:txFillClrLst/>
-    <dgm:txEffectClrLst/>
-  </dgm:styleLbl>
-  <dgm:styleLbl name="asst3">
-    <dgm:fillClrLst meth="repeat">
-      <a:schemeClr val="accent1"/>
-    </dgm:fillClrLst>
-    <dgm:linClrLst meth="repeat">
-      <a:schemeClr val="lt1"/>
-    </dgm:linClrLst>
-    <dgm:effectClrLst/>
-    <dgm:txLinClrLst/>
-    <dgm:txFillClrLst/>
-    <dgm:txEffectClrLst/>
-  </dgm:styleLbl>
-  <dgm:styleLbl name="asst4">
-    <dgm:fillClrLst meth="repeat">
-      <a:schemeClr val="accent1"/>
-    </dgm:fillClrLst>
-    <dgm:linClrLst meth="repeat">
-      <a:schemeClr val="lt1"/>
-    </dgm:linClrLst>
-    <dgm:effectClrLst/>
-    <dgm:txLinClrLst/>
-    <dgm:txFillClrLst/>
-    <dgm:txEffectClrLst/>
-  </dgm:styleLbl>
-  <dgm:styleLbl name="parChTrans2D1">
-    <dgm:fillClrLst meth="repeat">
-      <a:schemeClr val="accent1">
-        <a:tint val="60000"/>
-      </a:schemeClr>
-    </dgm:fillClrLst>
-    <dgm:linClrLst meth="repeat">
-      <a:schemeClr val="accent1">
-        <a:tint val="60000"/>
-      </a:schemeClr>
-    </dgm:linClrLst>
-    <dgm:effectClrLst/>
-    <dgm:txLinClrLst/>
-    <dgm:txFillClrLst meth="repeat">
-      <a:schemeClr val="lt1"/>
-    </dgm:txFillClrLst>
-    <dgm:txEffectClrLst/>
-  </dgm:styleLbl>
-  <dgm:styleLbl name="parChTrans2D2">
-    <dgm:fillClrLst meth="repeat">
-      <a:schemeClr val="accent1"/>
-    </dgm:fillClrLst>
-    <dgm:linClrLst meth="repeat">
-      <a:schemeClr val="accent1"/>
-    </dgm:linClrLst>
-    <dgm:effectClrLst/>
-    <dgm:txLinClrLst/>
-    <dgm:txFillClrLst meth="repeat">
-      <a:schemeClr val="lt1"/>
-    </dgm:txFillClrLst>
-    <dgm:txEffectClrLst/>
-  </dgm:styleLbl>
-  <dgm:styleLbl name="parChTrans2D3">
-    <dgm:fillClrLst meth="repeat">
-      <a:schemeClr val="accent1"/>
-    </dgm:fillClrLst>
-    <dgm:linClrLst meth="repeat">
-      <a:schemeClr val="accent1"/>
-    </dgm:linClrLst>
-    <dgm:effectClrLst/>
-    <dgm:txLinClrLst/>
-    <dgm:txFillClrLst meth="repeat">
-      <a:schemeClr val="lt1"/>
-    </dgm:txFillClrLst>
-    <dgm:txEffectClrLst/>
-  </dgm:styleLbl>
-  <dgm:styleLbl name="parChTrans2D4">
-    <dgm:fillClrLst meth="repeat">
-      <a:schemeClr val="accent1"/>
-    </dgm:fillClrLst>
-    <dgm:linClrLst meth="repeat">
-      <a:schemeClr val="accent1"/>
-    </dgm:linClrLst>
-    <dgm:effectClrLst/>
-    <dgm:txLinClrLst/>
-    <dgm:txFillClrLst meth="repeat">
-      <a:schemeClr val="lt1"/>
-    </dgm:txFillClrLst>
-    <dgm:txEffectClrLst/>
-  </dgm:styleLbl>
-  <dgm:styleLbl name="parChTrans1D1">
-    <dgm:fillClrLst meth="repeat">
-      <a:schemeClr val="accent1"/>
-    </dgm:fillClrLst>
-    <dgm:linClrLst meth="repeat">
-      <a:schemeClr val="accent1">
-        <a:shade val="60000"/>
-      </a:schemeClr>
-    </dgm:linClrLst>
-    <dgm:effectClrLst/>
-    <dgm:txLinClrLst/>
-    <dgm:txFillClrLst meth="repeat">
-      <a:schemeClr val="tx1"/>
-    </dgm:txFillClrLst>
-    <dgm:txEffectClrLst/>
-  </dgm:styleLbl>
-  <dgm:styleLbl name="parChTrans1D2">
-    <dgm:fillClrLst meth="repeat">
-      <a:schemeClr val="accent1"/>
-    </dgm:fillClrLst>
-    <dgm:linClrLst meth="repeat">
-      <a:schemeClr val="accent1">
-        <a:shade val="60000"/>
-      </a:schemeClr>
-    </dgm:linClrLst>
-    <dgm:effectClrLst/>
-    <dgm:txLinClrLst/>
-    <dgm:txFillClrLst meth="repeat">
-      <a:schemeClr val="tx1"/>
-    </dgm:txFillClrLst>
-    <dgm:txEffectClrLst/>
-  </dgm:styleLbl>
-  <dgm:styleLbl name="parChTrans1D3">
-    <dgm:fillClrLst meth="repeat">
-      <a:schemeClr val="accent1"/>
-    </dgm:fillClrLst>
-    <dgm:linClrLst meth="repeat">
-      <a:schemeClr val="accent1">
-        <a:shade val="80000"/>
-      </a:schemeClr>
-    </dgm:linClrLst>
-    <dgm:effectClrLst/>
-    <dgm:txLinClrLst/>
-    <dgm:txFillClrLst meth="repeat">
-      <a:schemeClr val="tx1"/>
-    </dgm:txFillClrLst>
-    <dgm:txEffectClrLst/>
-  </dgm:styleLbl>
-  <dgm:styleLbl name="parChTrans1D4">
-    <dgm:fillClrLst meth="repeat">
-      <a:schemeClr val="accent1"/>
-    </dgm:fillClrLst>
-    <dgm:linClrLst meth="repeat">
-      <a:schemeClr val="accent1">
-        <a:shade val="80000"/>
-      </a:schemeClr>
-    </dgm:linClrLst>
-    <dgm:effectClrLst/>
-    <dgm:txLinClrLst/>
-    <dgm:txFillClrLst meth="repeat">
-      <a:schemeClr val="tx1"/>
-    </dgm:txFillClrLst>
-    <dgm:txEffectClrLst/>
-  </dgm:styleLbl>
-  <dgm:styleLbl name="fgAcc1">
-    <dgm:fillClrLst meth="repeat">
-      <a:schemeClr val="lt1">
-        <a:alpha val="90000"/>
-      </a:schemeClr>
-    </dgm:fillClrLst>
-    <dgm:linClrLst meth="repeat">
-      <a:schemeClr val="accent1"/>
-    </dgm:linClrLst>
-    <dgm:effectClrLst/>
-    <dgm:txLinClrLst/>
-    <dgm:txFillClrLst meth="repeat">
-      <a:schemeClr val="dk1"/>
-    </dgm:txFillClrLst>
-    <dgm:txEffectClrLst/>
-  </dgm:styleLbl>
-  <dgm:styleLbl name="conFgAcc1">
-    <dgm:fillClrLst meth="repeat">
-      <a:schemeClr val="lt1">
-        <a:alpha val="90000"/>
-      </a:schemeClr>
-    </dgm:fillClrLst>
-    <dgm:linClrLst meth="repeat">
-      <a:schemeClr val="accent1"/>
-    </dgm:linClrLst>
-    <dgm:effectClrLst/>
-    <dgm:txLinClrLst/>
-    <dgm:txFillClrLst meth="repeat">
-      <a:schemeClr val="dk1"/>
-    </dgm:txFillClrLst>
-    <dgm:txEffectClrLst/>
-  </dgm:styleLbl>
-  <dgm:styleLbl name="alignAcc1">
-    <dgm:fillClrLst meth="repeat">
-      <a:schemeClr val="lt1">
-        <a:alpha val="90000"/>
-      </a:schemeClr>
-    </dgm:fillClrLst>
-    <dgm:linClrLst meth="repeat">
-      <a:schemeClr val="accent1"/>
-    </dgm:linClrLst>
-    <dgm:effectClrLst/>
-    <dgm:txLinClrLst/>
-    <dgm:txFillClrLst meth="repeat">
-      <a:schemeClr val="dk1"/>
-    </dgm:txFillClrLst>
-    <dgm:txEffectClrLst/>
-  </dgm:styleLbl>
-  <dgm:styleLbl name="trAlignAcc1">
-    <dgm:fillClrLst meth="repeat">
-      <a:schemeClr val="lt1">
-        <a:alpha val="40000"/>
-      </a:schemeClr>
-    </dgm:fillClrLst>
-    <dgm:linClrLst meth="repeat">
-      <a:schemeClr val="accent1"/>
-    </dgm:linClrLst>
-    <dgm:effectClrLst/>
-    <dgm:txLinClrLst/>
-    <dgm:txFillClrLst meth="repeat">
-      <a:schemeClr val="dk1"/>
-    </dgm:txFillClrLst>
-    <dgm:txEffectClrLst/>
-  </dgm:styleLbl>
-  <dgm:styleLbl name="bgAcc1">
-    <dgm:fillClrLst meth="repeat">
-      <a:schemeClr val="lt1">
-        <a:alpha val="90000"/>
-      </a:schemeClr>
-    </dgm:fillClrLst>
-    <dgm:linClrLst meth="repeat">
-      <a:schemeClr val="accent1"/>
-    </dgm:linClrLst>
-    <dgm:effectClrLst/>
-    <dgm:txLinClrLst/>
-    <dgm:txFillClrLst meth="repeat">
-      <a:schemeClr val="dk1"/>
-    </dgm:txFillClrLst>
-    <dgm:txEffectClrLst/>
-  </dgm:styleLbl>
-  <dgm:styleLbl name="solidFgAcc1">
-    <dgm:fillClrLst meth="repeat">
-      <a:schemeClr val="lt1"/>
-    </dgm:fillClrLst>
-    <dgm:linClrLst meth="repeat">
-      <a:schemeClr val="accent1"/>
-    </dgm:linClrLst>
-    <dgm:effectClrLst/>
-    <dgm:txLinClrLst/>
-    <dgm:txFillClrLst meth="repeat">
-      <a:schemeClr val="dk1"/>
-    </dgm:txFillClrLst>
-    <dgm:txEffectClrLst/>
-  </dgm:styleLbl>
-  <dgm:styleLbl name="solidAlignAcc1">
-    <dgm:fillClrLst meth="repeat">
-      <a:schemeClr val="lt1"/>
-    </dgm:fillClrLst>
-    <dgm:linClrLst meth="repeat">
-      <a:schemeClr val="accent1"/>
-    </dgm:linClrLst>
-    <dgm:effectClrLst/>
-    <dgm:txLinClrLst/>
-    <dgm:txFillClrLst meth="repeat">
-      <a:schemeClr val="dk1"/>
-    </dgm:txFillClrLst>
-    <dgm:txEffectClrLst/>
-  </dgm:styleLbl>
-  <dgm:styleLbl name="solidBgAcc1">
-    <dgm:fillClrLst meth="repeat">
-      <a:schemeClr val="lt1"/>
-    </dgm:fillClrLst>
-    <dgm:linClrLst meth="repeat">
-      <a:schemeClr val="accent1"/>
-    </dgm:linClrLst>
-    <dgm:effectClrLst/>
-    <dgm:txLinClrLst/>
-    <dgm:txFillClrLst meth="repeat">
-      <a:schemeClr val="dk1"/>
-    </dgm:txFillClrLst>
-    <dgm:txEffectClrLst/>
-  </dgm:styleLbl>
-  <dgm:styleLbl name="fgAccFollowNode1">
-    <dgm:fillClrLst meth="repeat">
-      <a:schemeClr val="accent1">
-        <a:alpha val="90000"/>
-        <a:tint val="40000"/>
-      </a:schemeClr>
-    </dgm:fillClrLst>
-    <dgm:linClrLst meth="repeat">
-      <a:schemeClr val="accent1">
-        <a:alpha val="90000"/>
-        <a:tint val="40000"/>
-      </a:schemeClr>
-    </dgm:linClrLst>
-    <dgm:effectClrLst/>
-    <dgm:txLinClrLst/>
-    <dgm:txFillClrLst meth="repeat">
-      <a:schemeClr val="dk1"/>
-    </dgm:txFillClrLst>
-    <dgm:txEffectClrLst/>
-  </dgm:styleLbl>
-  <dgm:styleLbl name="alignAccFollowNode1">
-    <dgm:fillClrLst meth="repeat">
-      <a:schemeClr val="accent1">
-        <a:alpha val="90000"/>
-        <a:tint val="40000"/>
-      </a:schemeClr>
-    </dgm:fillClrLst>
-    <dgm:linClrLst meth="repeat">
-      <a:schemeClr val="accent1">
-        <a:alpha val="90000"/>
-        <a:tint val="40000"/>
-      </a:schemeClr>
-    </dgm:linClrLst>
-    <dgm:effectClrLst/>
-    <dgm:txLinClrLst/>
-    <dgm:txFillClrLst meth="repeat">
-      <a:schemeClr val="dk1"/>
-    </dgm:txFillClrLst>
-    <dgm:txEffectClrLst/>
-  </dgm:styleLbl>
-  <dgm:styleLbl name="bgAccFollowNode1">
-    <dgm:fillClrLst meth="repeat">
-      <a:schemeClr val="bg1">
-        <a:lumMod val="95000"/>
-      </a:schemeClr>
-    </dgm:fillClrLst>
-    <dgm:linClrLst>
-      <a:schemeClr val="bg1">
-        <a:lumMod val="95000"/>
-      </a:schemeClr>
-    </dgm:linClrLst>
-    <dgm:effectClrLst/>
-    <dgm:txLinClrLst/>
-    <dgm:txFillClrLst meth="repeat">
-      <a:schemeClr val="tx1">
-        <a:lumMod val="75000"/>
-        <a:lumOff val="25000"/>
-      </a:schemeClr>
-    </dgm:txFillClrLst>
-    <dgm:txEffectClrLst/>
-  </dgm:styleLbl>
-  <dgm:styleLbl name="fgAcc0">
-    <dgm:fillClrLst meth="repeat">
-      <a:schemeClr val="lt1">
-        <a:alpha val="90000"/>
-      </a:schemeClr>
-    </dgm:fillClrLst>
-    <dgm:linClrLst meth="repeat">
-      <a:schemeClr val="accent1"/>
-    </dgm:linClrLst>
-    <dgm:effectClrLst/>
-    <dgm:txLinClrLst/>
-    <dgm:txFillClrLst meth="repeat">
-      <a:schemeClr val="dk1"/>
-    </dgm:txFillClrLst>
-    <dgm:txEffectClrLst/>
-  </dgm:styleLbl>
-  <dgm:styleLbl name="fgAcc2">
-    <dgm:fillClrLst meth="repeat">
-      <a:schemeClr val="lt1">
-        <a:alpha val="90000"/>
-      </a:schemeClr>
-    </dgm:fillClrLst>
-    <dgm:linClrLst meth="repeat">
-      <a:schemeClr val="accent1"/>
-    </dgm:linClrLst>
-    <dgm:effectClrLst/>
-    <dgm:txLinClrLst/>
-    <dgm:txFillClrLst meth="repeat">
-      <a:schemeClr val="dk1"/>
-    </dgm:txFillClrLst>
-    <dgm:txEffectClrLst/>
-  </dgm:styleLbl>
-  <dgm:styleLbl name="fgAcc3">
-    <dgm:fillClrLst meth="repeat">
-      <a:schemeClr val="lt1">
-        <a:alpha val="90000"/>
-      </a:schemeClr>
-    </dgm:fillClrLst>
-    <dgm:linClrLst meth="repeat">
-      <a:schemeClr val="accent1"/>
-    </dgm:linClrLst>
-    <dgm:effectClrLst/>
-    <dgm:txLinClrLst/>
-    <dgm:txFillClrLst meth="repeat">
-      <a:schemeClr val="dk1"/>
-    </dgm:txFillClrLst>
-    <dgm:txEffectClrLst/>
-  </dgm:styleLbl>
-  <dgm:styleLbl name="fgAcc4">
-    <dgm:fillClrLst meth="repeat">
-      <a:schemeClr val="lt1">
-        <a:alpha val="90000"/>
-      </a:schemeClr>
-    </dgm:fillClrLst>
-    <dgm:linClrLst meth="repeat">
-      <a:schemeClr val="accent1"/>
-    </dgm:linClrLst>
-    <dgm:effectClrLst/>
-    <dgm:txLinClrLst/>
-    <dgm:txFillClrLst meth="repeat">
-      <a:schemeClr val="dk1"/>
-    </dgm:txFillClrLst>
-    <dgm:txEffectClrLst/>
-  </dgm:styleLbl>
-  <dgm:styleLbl name="bgShp">
-    <dgm:fillClrLst meth="repeat">
-      <a:schemeClr val="accent1">
-        <a:tint val="40000"/>
-      </a:schemeClr>
-    </dgm:fillClrLst>
-    <dgm:linClrLst meth="repeat">
-      <a:schemeClr val="accent1"/>
-    </dgm:linClrLst>
-    <dgm:effectClrLst/>
-    <dgm:txLinClrLst/>
-    <dgm:txFillClrLst meth="repeat">
-      <a:schemeClr val="dk1"/>
-    </dgm:txFillClrLst>
-    <dgm:txEffectClrLst/>
-  </dgm:styleLbl>
-  <dgm:styleLbl name="dkBgShp">
-    <dgm:fillClrLst meth="repeat">
-      <a:schemeClr val="accent1">
-        <a:shade val="80000"/>
-      </a:schemeClr>
-    </dgm:fillClrLst>
-    <dgm:linClrLst meth="repeat">
-      <a:schemeClr val="accent1"/>
-    </dgm:linClrLst>
-    <dgm:effectClrLst/>
-    <dgm:txLinClrLst/>
-    <dgm:txFillClrLst meth="repeat">
-      <a:schemeClr val="lt1"/>
-    </dgm:txFillClrLst>
-    <dgm:txEffectClrLst/>
-  </dgm:styleLbl>
-  <dgm:styleLbl name="trBgShp">
-    <dgm:fillClrLst meth="repeat">
-      <a:schemeClr val="accent1">
-        <a:tint val="50000"/>
-        <a:alpha val="40000"/>
-      </a:schemeClr>
-    </dgm:fillClrLst>
-    <dgm:linClrLst meth="repeat">
-      <a:schemeClr val="accent1"/>
-    </dgm:linClrLst>
-    <dgm:effectClrLst/>
-    <dgm:txLinClrLst/>
-    <dgm:txFillClrLst meth="repeat">
-      <a:schemeClr val="lt1"/>
-    </dgm:txFillClrLst>
-    <dgm:txEffectClrLst/>
-  </dgm:styleLbl>
-  <dgm:styleLbl name="fgShp">
-    <dgm:fillClrLst meth="repeat">
-      <a:schemeClr val="accent1">
-        <a:tint val="60000"/>
-      </a:schemeClr>
-    </dgm:fillClrLst>
-    <dgm:linClrLst meth="repeat">
-      <a:schemeClr val="lt1"/>
-    </dgm:linClrLst>
-    <dgm:effectClrLst/>
-    <dgm:txLinClrLst/>
-    <dgm:txFillClrLst meth="repeat">
-      <a:schemeClr val="dk1"/>
-    </dgm:txFillClrLst>
-    <dgm:txEffectClrLst/>
-  </dgm:styleLbl>
-  <dgm:styleLbl name="revTx">
-    <dgm:fillClrLst meth="repeat">
-      <a:schemeClr val="lt1">
-        <a:alpha val="0"/>
-      </a:schemeClr>
-    </dgm:fillClrLst>
-    <dgm:linClrLst meth="repeat">
-      <a:schemeClr val="dk1">
-        <a:alpha val="0"/>
-      </a:schemeClr>
-    </dgm:linClrLst>
-    <dgm:effectClrLst/>
-    <dgm:txLinClrLst/>
-    <dgm:txFillClrLst meth="repeat">
-      <a:schemeClr val="tx1"/>
-    </dgm:txFillClrLst>
-    <dgm:txEffectClrLst/>
-  </dgm:styleLbl>
-</dgm:colorsDef>
-</file>
-
-<file path=ppt/diagrams/data1.xml><?xml version="1.0" encoding="utf-8"?>
-<dgm:dataModel xmlns:dgm="http://schemas.openxmlformats.org/drawingml/2006/diagram" xmlns:a="http://schemas.openxmlformats.org/drawingml/2006/main">
-  <dgm:ptLst>
-    <dgm:pt modelId="{3ADA368F-58D1-4815-9C64-2C099221515E}" type="doc">
-      <dgm:prSet loTypeId="urn:microsoft.com/office/officeart/2016/7/layout/BasicLinearProcessNumbered" loCatId="process" qsTypeId="urn:microsoft.com/office/officeart/2005/8/quickstyle/simple1" qsCatId="simple" csTypeId="urn:microsoft.com/office/officeart/2005/8/colors/ColorSchemeForSuggestions" csCatId="other" phldr="1"/>
-      <dgm:spPr/>
-      <dgm:t>
-        <a:bodyPr/>
-        <a:lstStyle/>
-        <a:p>
-          <a:endParaRPr lang="en-US"/>
-        </a:p>
-      </dgm:t>
-    </dgm:pt>
-    <dgm:pt modelId="{92E9BE8C-7E61-400A-B40E-75AE559848B6}">
-      <dgm:prSet/>
-      <dgm:spPr/>
-      <dgm:t>
-        <a:bodyPr/>
-        <a:lstStyle/>
-        <a:p>
-          <a:r>
-            <a:rPr lang="en-US"/>
-            <a:t>Open up</a:t>
-          </a:r>
-        </a:p>
-      </dgm:t>
-    </dgm:pt>
-    <dgm:pt modelId="{584C8253-DC20-4388-9C65-B583C8141864}" type="parTrans" cxnId="{13D3EF6E-A501-4CB2-BC0E-1F32B06902F7}">
-      <dgm:prSet/>
-      <dgm:spPr/>
-      <dgm:t>
-        <a:bodyPr/>
-        <a:lstStyle/>
-        <a:p>
-          <a:endParaRPr lang="en-US"/>
-        </a:p>
-      </dgm:t>
-    </dgm:pt>
-    <dgm:pt modelId="{29FF9860-CCCD-41C6-979B-4647F071FF1F}" type="sibTrans" cxnId="{13D3EF6E-A501-4CB2-BC0E-1F32B06902F7}">
-      <dgm:prSet phldrT="1"/>
-      <dgm:spPr/>
-      <dgm:t>
-        <a:bodyPr/>
-        <a:lstStyle/>
-        <a:p>
-          <a:r>
-            <a:rPr lang="en-US"/>
-            <a:t>1</a:t>
-          </a:r>
-        </a:p>
-      </dgm:t>
-    </dgm:pt>
-    <dgm:pt modelId="{2D2DE811-1146-46C7-94BB-D0C8B061F3A0}">
-      <dgm:prSet/>
-      <dgm:spPr/>
-      <dgm:t>
-        <a:bodyPr/>
-        <a:lstStyle/>
-        <a:p>
-          <a:r>
-            <a:rPr lang="en-US"/>
-            <a:t>Open up the AT_Command_HC-06 ino file</a:t>
-          </a:r>
-        </a:p>
-      </dgm:t>
-    </dgm:pt>
-    <dgm:pt modelId="{477CE431-31F9-4B60-B928-B2E1CAD66A75}" type="parTrans" cxnId="{BF55DE0C-1BE4-493F-8FC0-F1789A98203B}">
-      <dgm:prSet/>
-      <dgm:spPr/>
-      <dgm:t>
-        <a:bodyPr/>
-        <a:lstStyle/>
-        <a:p>
-          <a:endParaRPr lang="en-US"/>
-        </a:p>
-      </dgm:t>
-    </dgm:pt>
-    <dgm:pt modelId="{42568D19-91DC-4688-994E-69C6D12C86B6}" type="sibTrans" cxnId="{BF55DE0C-1BE4-493F-8FC0-F1789A98203B}">
-      <dgm:prSet/>
-      <dgm:spPr/>
-      <dgm:t>
-        <a:bodyPr/>
-        <a:lstStyle/>
-        <a:p>
-          <a:endParaRPr lang="en-US"/>
-        </a:p>
-      </dgm:t>
-    </dgm:pt>
-    <dgm:pt modelId="{9D69C459-D4A5-4AD7-9C0B-53B204E2E503}">
-      <dgm:prSet/>
-      <dgm:spPr/>
-      <dgm:t>
-        <a:bodyPr/>
-        <a:lstStyle/>
-        <a:p>
-          <a:r>
-            <a:rPr lang="en-US"/>
-            <a:t>Read</a:t>
-          </a:r>
-        </a:p>
-      </dgm:t>
-    </dgm:pt>
-    <dgm:pt modelId="{0C5E1175-D0D8-4176-9157-4A706C9CD91F}" type="parTrans" cxnId="{4C4E899A-C9D2-4AA7-A671-3803483A177D}">
-      <dgm:prSet/>
-      <dgm:spPr/>
-      <dgm:t>
-        <a:bodyPr/>
-        <a:lstStyle/>
-        <a:p>
-          <a:endParaRPr lang="en-US"/>
-        </a:p>
-      </dgm:t>
-    </dgm:pt>
-    <dgm:pt modelId="{26D3B5D6-FEFB-4E31-B247-76959269060D}" type="sibTrans" cxnId="{4C4E899A-C9D2-4AA7-A671-3803483A177D}">
-      <dgm:prSet phldrT="2"/>
-      <dgm:spPr/>
-      <dgm:t>
-        <a:bodyPr/>
-        <a:lstStyle/>
-        <a:p>
-          <a:r>
-            <a:rPr lang="en-US"/>
-            <a:t>2</a:t>
-          </a:r>
-        </a:p>
-      </dgm:t>
-    </dgm:pt>
-    <dgm:pt modelId="{AAA7808D-58FA-413A-8547-288274F0B883}">
-      <dgm:prSet/>
-      <dgm:spPr/>
-      <dgm:t>
-        <a:bodyPr/>
-        <a:lstStyle/>
-        <a:p>
-          <a:r>
-            <a:rPr lang="en-US"/>
-            <a:t>Read the instructions carefully before running the program</a:t>
-          </a:r>
-        </a:p>
-      </dgm:t>
-    </dgm:pt>
-    <dgm:pt modelId="{D1B06059-55E7-4C05-80F6-51CED99B4D62}" type="parTrans" cxnId="{8413EB79-ABCE-4693-8A96-5B310FC4BE73}">
-      <dgm:prSet/>
-      <dgm:spPr/>
-      <dgm:t>
-        <a:bodyPr/>
-        <a:lstStyle/>
-        <a:p>
-          <a:endParaRPr lang="en-US"/>
-        </a:p>
-      </dgm:t>
-    </dgm:pt>
-    <dgm:pt modelId="{6F31D6F2-DC7A-490F-916E-0EBE67D886D0}" type="sibTrans" cxnId="{8413EB79-ABCE-4693-8A96-5B310FC4BE73}">
-      <dgm:prSet/>
-      <dgm:spPr/>
-      <dgm:t>
-        <a:bodyPr/>
-        <a:lstStyle/>
-        <a:p>
-          <a:endParaRPr lang="en-US"/>
-        </a:p>
-      </dgm:t>
-    </dgm:pt>
-    <dgm:pt modelId="{6A26AE82-D524-4820-81B3-0F37EBB803A8}">
-      <dgm:prSet/>
-      <dgm:spPr/>
-      <dgm:t>
-        <a:bodyPr/>
-        <a:lstStyle/>
-        <a:p>
-          <a:r>
-            <a:rPr lang="en-US"/>
-            <a:t>Refer</a:t>
-          </a:r>
-        </a:p>
-      </dgm:t>
-    </dgm:pt>
-    <dgm:pt modelId="{946BC25A-8BCC-43EC-A80C-050C4C87004F}" type="parTrans" cxnId="{F72603E4-6E74-4850-80B8-2A048ED9DC48}">
-      <dgm:prSet/>
-      <dgm:spPr/>
-      <dgm:t>
-        <a:bodyPr/>
-        <a:lstStyle/>
-        <a:p>
-          <a:endParaRPr lang="en-US"/>
-        </a:p>
-      </dgm:t>
-    </dgm:pt>
-    <dgm:pt modelId="{7BB0AAD3-1093-45D3-848E-058237E96457}" type="sibTrans" cxnId="{F72603E4-6E74-4850-80B8-2A048ED9DC48}">
-      <dgm:prSet phldrT="3"/>
-      <dgm:spPr/>
-      <dgm:t>
-        <a:bodyPr/>
-        <a:lstStyle/>
-        <a:p>
-          <a:r>
-            <a:rPr lang="en-US"/>
-            <a:t>3</a:t>
-          </a:r>
-        </a:p>
-      </dgm:t>
-    </dgm:pt>
-    <dgm:pt modelId="{03B5ACB1-CA5B-4AB2-A410-5C59E4872115}">
-      <dgm:prSet/>
-      <dgm:spPr/>
-      <dgm:t>
-        <a:bodyPr/>
-        <a:lstStyle/>
-        <a:p>
-          <a:r>
-            <a:rPr lang="en-US" dirty="0"/>
-            <a:t>Refer to the next two slides for more information regarding the AT Command of HC-06.</a:t>
-          </a:r>
-        </a:p>
-      </dgm:t>
-    </dgm:pt>
-    <dgm:pt modelId="{64416B6F-CA88-4D07-8983-E0F6728840F2}" type="parTrans" cxnId="{4CB3BFDF-2A4D-4134-A127-42E51F8B4FD0}">
-      <dgm:prSet/>
-      <dgm:spPr/>
-      <dgm:t>
-        <a:bodyPr/>
-        <a:lstStyle/>
-        <a:p>
-          <a:endParaRPr lang="en-US"/>
-        </a:p>
-      </dgm:t>
-    </dgm:pt>
-    <dgm:pt modelId="{3929049F-1CB5-4A77-A9E8-D88A14C01456}" type="sibTrans" cxnId="{4CB3BFDF-2A4D-4134-A127-42E51F8B4FD0}">
-      <dgm:prSet/>
-      <dgm:spPr/>
-      <dgm:t>
-        <a:bodyPr/>
-        <a:lstStyle/>
-        <a:p>
-          <a:endParaRPr lang="en-US"/>
-        </a:p>
-      </dgm:t>
-    </dgm:pt>
-    <dgm:pt modelId="{A17326AA-E9C3-4221-9D23-DB9B86BCF806}" type="pres">
-      <dgm:prSet presAssocID="{3ADA368F-58D1-4815-9C64-2C099221515E}" presName="Name0" presStyleCnt="0">
-        <dgm:presLayoutVars>
-          <dgm:animLvl val="lvl"/>
-          <dgm:resizeHandles val="exact"/>
-        </dgm:presLayoutVars>
-      </dgm:prSet>
-      <dgm:spPr/>
-    </dgm:pt>
-    <dgm:pt modelId="{4F6020D5-6A4B-48DD-B9AC-BB2DDDBBA163}" type="pres">
-      <dgm:prSet presAssocID="{92E9BE8C-7E61-400A-B40E-75AE559848B6}" presName="compositeNode" presStyleCnt="0">
-        <dgm:presLayoutVars>
-          <dgm:bulletEnabled val="1"/>
-        </dgm:presLayoutVars>
-      </dgm:prSet>
-      <dgm:spPr/>
-    </dgm:pt>
-    <dgm:pt modelId="{B910C664-21E7-4F50-8BC0-B7B8A4C8AC0F}" type="pres">
-      <dgm:prSet presAssocID="{92E9BE8C-7E61-400A-B40E-75AE559848B6}" presName="bgRect" presStyleLbl="bgAccFollowNode1" presStyleIdx="0" presStyleCnt="3"/>
-      <dgm:spPr/>
-    </dgm:pt>
-    <dgm:pt modelId="{236BCA55-3BDF-4F2A-B2AF-C6F11FC5464C}" type="pres">
-      <dgm:prSet presAssocID="{29FF9860-CCCD-41C6-979B-4647F071FF1F}" presName="sibTransNodeCircle" presStyleLbl="alignNode1" presStyleIdx="0" presStyleCnt="6">
-        <dgm:presLayoutVars>
-          <dgm:chMax val="0"/>
-          <dgm:bulletEnabled/>
-        </dgm:presLayoutVars>
-      </dgm:prSet>
-      <dgm:spPr/>
-    </dgm:pt>
-    <dgm:pt modelId="{56F8E0A7-5430-4B08-8A04-275D8C9D786E}" type="pres">
-      <dgm:prSet presAssocID="{92E9BE8C-7E61-400A-B40E-75AE559848B6}" presName="bottomLine" presStyleLbl="alignNode1" presStyleIdx="1" presStyleCnt="6">
-        <dgm:presLayoutVars/>
-      </dgm:prSet>
-      <dgm:spPr/>
-    </dgm:pt>
-    <dgm:pt modelId="{242CBAC2-4EE4-40BC-AC36-E1BA0FA8EAE7}" type="pres">
-      <dgm:prSet presAssocID="{92E9BE8C-7E61-400A-B40E-75AE559848B6}" presName="nodeText" presStyleLbl="bgAccFollowNode1" presStyleIdx="0" presStyleCnt="3">
-        <dgm:presLayoutVars>
-          <dgm:bulletEnabled val="1"/>
-        </dgm:presLayoutVars>
-      </dgm:prSet>
-      <dgm:spPr/>
-    </dgm:pt>
-    <dgm:pt modelId="{4300E9E7-EB82-476F-880B-E5AC0F9F710B}" type="pres">
-      <dgm:prSet presAssocID="{29FF9860-CCCD-41C6-979B-4647F071FF1F}" presName="sibTrans" presStyleCnt="0"/>
-      <dgm:spPr/>
-    </dgm:pt>
-    <dgm:pt modelId="{F6EB830B-4CF7-4AE1-A0C8-376E3D2DC4D7}" type="pres">
-      <dgm:prSet presAssocID="{9D69C459-D4A5-4AD7-9C0B-53B204E2E503}" presName="compositeNode" presStyleCnt="0">
-        <dgm:presLayoutVars>
-          <dgm:bulletEnabled val="1"/>
-        </dgm:presLayoutVars>
-      </dgm:prSet>
-      <dgm:spPr/>
-    </dgm:pt>
-    <dgm:pt modelId="{9EC51152-A9D3-4C02-AFD8-EEA62A989091}" type="pres">
-      <dgm:prSet presAssocID="{9D69C459-D4A5-4AD7-9C0B-53B204E2E503}" presName="bgRect" presStyleLbl="bgAccFollowNode1" presStyleIdx="1" presStyleCnt="3"/>
-      <dgm:spPr/>
-    </dgm:pt>
-    <dgm:pt modelId="{FF3EC7B0-98C5-4C89-B220-6785684BF4D4}" type="pres">
-      <dgm:prSet presAssocID="{26D3B5D6-FEFB-4E31-B247-76959269060D}" presName="sibTransNodeCircle" presStyleLbl="alignNode1" presStyleIdx="2" presStyleCnt="6">
-        <dgm:presLayoutVars>
-          <dgm:chMax val="0"/>
-          <dgm:bulletEnabled/>
-        </dgm:presLayoutVars>
-      </dgm:prSet>
-      <dgm:spPr/>
-    </dgm:pt>
-    <dgm:pt modelId="{1E1828BA-C14C-4131-9488-DD01545000A8}" type="pres">
-      <dgm:prSet presAssocID="{9D69C459-D4A5-4AD7-9C0B-53B204E2E503}" presName="bottomLine" presStyleLbl="alignNode1" presStyleIdx="3" presStyleCnt="6">
-        <dgm:presLayoutVars/>
-      </dgm:prSet>
-      <dgm:spPr/>
-    </dgm:pt>
-    <dgm:pt modelId="{0FBF6162-84FB-456C-ACF2-D85E3FD318DF}" type="pres">
-      <dgm:prSet presAssocID="{9D69C459-D4A5-4AD7-9C0B-53B204E2E503}" presName="nodeText" presStyleLbl="bgAccFollowNode1" presStyleIdx="1" presStyleCnt="3">
-        <dgm:presLayoutVars>
-          <dgm:bulletEnabled val="1"/>
-        </dgm:presLayoutVars>
-      </dgm:prSet>
-      <dgm:spPr/>
-    </dgm:pt>
-    <dgm:pt modelId="{794C246F-47F5-4C4F-92C1-B4445630DA63}" type="pres">
-      <dgm:prSet presAssocID="{26D3B5D6-FEFB-4E31-B247-76959269060D}" presName="sibTrans" presStyleCnt="0"/>
-      <dgm:spPr/>
-    </dgm:pt>
-    <dgm:pt modelId="{DBF86919-E3D0-49AF-B792-EB21CD922E7D}" type="pres">
-      <dgm:prSet presAssocID="{6A26AE82-D524-4820-81B3-0F37EBB803A8}" presName="compositeNode" presStyleCnt="0">
-        <dgm:presLayoutVars>
-          <dgm:bulletEnabled val="1"/>
-        </dgm:presLayoutVars>
-      </dgm:prSet>
-      <dgm:spPr/>
-    </dgm:pt>
-    <dgm:pt modelId="{C5B24363-5EA1-42BB-A6C0-7AACEE1A0CAD}" type="pres">
-      <dgm:prSet presAssocID="{6A26AE82-D524-4820-81B3-0F37EBB803A8}" presName="bgRect" presStyleLbl="bgAccFollowNode1" presStyleIdx="2" presStyleCnt="3"/>
-      <dgm:spPr/>
-    </dgm:pt>
-    <dgm:pt modelId="{7E892C31-B92D-4746-B58F-7B854516D66E}" type="pres">
-      <dgm:prSet presAssocID="{7BB0AAD3-1093-45D3-848E-058237E96457}" presName="sibTransNodeCircle" presStyleLbl="alignNode1" presStyleIdx="4" presStyleCnt="6">
-        <dgm:presLayoutVars>
-          <dgm:chMax val="0"/>
-          <dgm:bulletEnabled/>
-        </dgm:presLayoutVars>
-      </dgm:prSet>
-      <dgm:spPr/>
-    </dgm:pt>
-    <dgm:pt modelId="{EF8867D2-3109-4C8C-888E-F995D5D9026C}" type="pres">
-      <dgm:prSet presAssocID="{6A26AE82-D524-4820-81B3-0F37EBB803A8}" presName="bottomLine" presStyleLbl="alignNode1" presStyleIdx="5" presStyleCnt="6">
-        <dgm:presLayoutVars/>
-      </dgm:prSet>
-      <dgm:spPr/>
-    </dgm:pt>
-    <dgm:pt modelId="{5F95E2D9-20CE-4142-8D9E-CC0F9F978925}" type="pres">
-      <dgm:prSet presAssocID="{6A26AE82-D524-4820-81B3-0F37EBB803A8}" presName="nodeText" presStyleLbl="bgAccFollowNode1" presStyleIdx="2" presStyleCnt="3">
-        <dgm:presLayoutVars>
-          <dgm:bulletEnabled val="1"/>
-        </dgm:presLayoutVars>
-      </dgm:prSet>
-      <dgm:spPr/>
-    </dgm:pt>
-  </dgm:ptLst>
-  <dgm:cxnLst>
-    <dgm:cxn modelId="{8A96AC05-69B4-4657-BF8A-606FFEDD8651}" type="presOf" srcId="{9D69C459-D4A5-4AD7-9C0B-53B204E2E503}" destId="{0FBF6162-84FB-456C-ACF2-D85E3FD318DF}" srcOrd="1" destOrd="0" presId="urn:microsoft.com/office/officeart/2016/7/layout/BasicLinearProcessNumbered"/>
-    <dgm:cxn modelId="{0C136D07-636D-4679-B791-C16F946C4C75}" type="presOf" srcId="{3ADA368F-58D1-4815-9C64-2C099221515E}" destId="{A17326AA-E9C3-4221-9D23-DB9B86BCF806}" srcOrd="0" destOrd="0" presId="urn:microsoft.com/office/officeart/2016/7/layout/BasicLinearProcessNumbered"/>
-    <dgm:cxn modelId="{BF55DE0C-1BE4-493F-8FC0-F1789A98203B}" srcId="{92E9BE8C-7E61-400A-B40E-75AE559848B6}" destId="{2D2DE811-1146-46C7-94BB-D0C8B061F3A0}" srcOrd="0" destOrd="0" parTransId="{477CE431-31F9-4B60-B928-B2E1CAD66A75}" sibTransId="{42568D19-91DC-4688-994E-69C6D12C86B6}"/>
-    <dgm:cxn modelId="{CAD93E20-10F3-4BAA-89DE-DFBC41BB94EB}" type="presOf" srcId="{03B5ACB1-CA5B-4AB2-A410-5C59E4872115}" destId="{5F95E2D9-20CE-4142-8D9E-CC0F9F978925}" srcOrd="0" destOrd="1" presId="urn:microsoft.com/office/officeart/2016/7/layout/BasicLinearProcessNumbered"/>
-    <dgm:cxn modelId="{13D3EF6E-A501-4CB2-BC0E-1F32B06902F7}" srcId="{3ADA368F-58D1-4815-9C64-2C099221515E}" destId="{92E9BE8C-7E61-400A-B40E-75AE559848B6}" srcOrd="0" destOrd="0" parTransId="{584C8253-DC20-4388-9C65-B583C8141864}" sibTransId="{29FF9860-CCCD-41C6-979B-4647F071FF1F}"/>
-    <dgm:cxn modelId="{19C9A350-4B7F-4DDF-B928-6087B2DD2B72}" type="presOf" srcId="{92E9BE8C-7E61-400A-B40E-75AE559848B6}" destId="{242CBAC2-4EE4-40BC-AC36-E1BA0FA8EAE7}" srcOrd="1" destOrd="0" presId="urn:microsoft.com/office/officeart/2016/7/layout/BasicLinearProcessNumbered"/>
-    <dgm:cxn modelId="{E96E0373-507A-42F6-85CB-B09B7750CC9F}" type="presOf" srcId="{7BB0AAD3-1093-45D3-848E-058237E96457}" destId="{7E892C31-B92D-4746-B58F-7B854516D66E}" srcOrd="0" destOrd="0" presId="urn:microsoft.com/office/officeart/2016/7/layout/BasicLinearProcessNumbered"/>
-    <dgm:cxn modelId="{8413EB79-ABCE-4693-8A96-5B310FC4BE73}" srcId="{9D69C459-D4A5-4AD7-9C0B-53B204E2E503}" destId="{AAA7808D-58FA-413A-8547-288274F0B883}" srcOrd="0" destOrd="0" parTransId="{D1B06059-55E7-4C05-80F6-51CED99B4D62}" sibTransId="{6F31D6F2-DC7A-490F-916E-0EBE67D886D0}"/>
-    <dgm:cxn modelId="{161C0E7B-C9C3-4946-886E-68475AC5B8CB}" type="presOf" srcId="{2D2DE811-1146-46C7-94BB-D0C8B061F3A0}" destId="{242CBAC2-4EE4-40BC-AC36-E1BA0FA8EAE7}" srcOrd="0" destOrd="1" presId="urn:microsoft.com/office/officeart/2016/7/layout/BasicLinearProcessNumbered"/>
-    <dgm:cxn modelId="{4C4E899A-C9D2-4AA7-A671-3803483A177D}" srcId="{3ADA368F-58D1-4815-9C64-2C099221515E}" destId="{9D69C459-D4A5-4AD7-9C0B-53B204E2E503}" srcOrd="1" destOrd="0" parTransId="{0C5E1175-D0D8-4176-9157-4A706C9CD91F}" sibTransId="{26D3B5D6-FEFB-4E31-B247-76959269060D}"/>
-    <dgm:cxn modelId="{D7ADC89A-C98C-4E0F-BF5E-24A62DE5EDBA}" type="presOf" srcId="{9D69C459-D4A5-4AD7-9C0B-53B204E2E503}" destId="{9EC51152-A9D3-4C02-AFD8-EEA62A989091}" srcOrd="0" destOrd="0" presId="urn:microsoft.com/office/officeart/2016/7/layout/BasicLinearProcessNumbered"/>
-    <dgm:cxn modelId="{FC2583A7-A346-4D58-B523-919F9A38E9BD}" type="presOf" srcId="{29FF9860-CCCD-41C6-979B-4647F071FF1F}" destId="{236BCA55-3BDF-4F2A-B2AF-C6F11FC5464C}" srcOrd="0" destOrd="0" presId="urn:microsoft.com/office/officeart/2016/7/layout/BasicLinearProcessNumbered"/>
-    <dgm:cxn modelId="{16E26CAF-2E4E-49F3-A75E-BDCEDF01F262}" type="presOf" srcId="{AAA7808D-58FA-413A-8547-288274F0B883}" destId="{0FBF6162-84FB-456C-ACF2-D85E3FD318DF}" srcOrd="0" destOrd="1" presId="urn:microsoft.com/office/officeart/2016/7/layout/BasicLinearProcessNumbered"/>
-    <dgm:cxn modelId="{A4C57ABD-5D1B-4373-B755-E14503DD35C1}" type="presOf" srcId="{26D3B5D6-FEFB-4E31-B247-76959269060D}" destId="{FF3EC7B0-98C5-4C89-B220-6785684BF4D4}" srcOrd="0" destOrd="0" presId="urn:microsoft.com/office/officeart/2016/7/layout/BasicLinearProcessNumbered"/>
-    <dgm:cxn modelId="{465BD5C0-3D19-44D7-9345-3757B243FD4E}" type="presOf" srcId="{92E9BE8C-7E61-400A-B40E-75AE559848B6}" destId="{B910C664-21E7-4F50-8BC0-B7B8A4C8AC0F}" srcOrd="0" destOrd="0" presId="urn:microsoft.com/office/officeart/2016/7/layout/BasicLinearProcessNumbered"/>
-    <dgm:cxn modelId="{FE96A7C2-4652-4D31-B747-F11BF58DB290}" type="presOf" srcId="{6A26AE82-D524-4820-81B3-0F37EBB803A8}" destId="{5F95E2D9-20CE-4142-8D9E-CC0F9F978925}" srcOrd="1" destOrd="0" presId="urn:microsoft.com/office/officeart/2016/7/layout/BasicLinearProcessNumbered"/>
-    <dgm:cxn modelId="{4CB3BFDF-2A4D-4134-A127-42E51F8B4FD0}" srcId="{6A26AE82-D524-4820-81B3-0F37EBB803A8}" destId="{03B5ACB1-CA5B-4AB2-A410-5C59E4872115}" srcOrd="0" destOrd="0" parTransId="{64416B6F-CA88-4D07-8983-E0F6728840F2}" sibTransId="{3929049F-1CB5-4A77-A9E8-D88A14C01456}"/>
-    <dgm:cxn modelId="{F72603E4-6E74-4850-80B8-2A048ED9DC48}" srcId="{3ADA368F-58D1-4815-9C64-2C099221515E}" destId="{6A26AE82-D524-4820-81B3-0F37EBB803A8}" srcOrd="2" destOrd="0" parTransId="{946BC25A-8BCC-43EC-A80C-050C4C87004F}" sibTransId="{7BB0AAD3-1093-45D3-848E-058237E96457}"/>
-    <dgm:cxn modelId="{00DCA5F9-1BC9-4CB6-8714-8EFE5789F308}" type="presOf" srcId="{6A26AE82-D524-4820-81B3-0F37EBB803A8}" destId="{C5B24363-5EA1-42BB-A6C0-7AACEE1A0CAD}" srcOrd="0" destOrd="0" presId="urn:microsoft.com/office/officeart/2016/7/layout/BasicLinearProcessNumbered"/>
-    <dgm:cxn modelId="{3CDB5E0A-8C77-47FF-B8EA-CC69FDFE84ED}" type="presParOf" srcId="{A17326AA-E9C3-4221-9D23-DB9B86BCF806}" destId="{4F6020D5-6A4B-48DD-B9AC-BB2DDDBBA163}" srcOrd="0" destOrd="0" presId="urn:microsoft.com/office/officeart/2016/7/layout/BasicLinearProcessNumbered"/>
-    <dgm:cxn modelId="{C3174D9D-77FF-46B9-8D7C-37C74C2BB952}" type="presParOf" srcId="{4F6020D5-6A4B-48DD-B9AC-BB2DDDBBA163}" destId="{B910C664-21E7-4F50-8BC0-B7B8A4C8AC0F}" srcOrd="0" destOrd="0" presId="urn:microsoft.com/office/officeart/2016/7/layout/BasicLinearProcessNumbered"/>
-    <dgm:cxn modelId="{D1821736-DD78-437E-9CE2-7FF4A4E55B50}" type="presParOf" srcId="{4F6020D5-6A4B-48DD-B9AC-BB2DDDBBA163}" destId="{236BCA55-3BDF-4F2A-B2AF-C6F11FC5464C}" srcOrd="1" destOrd="0" presId="urn:microsoft.com/office/officeart/2016/7/layout/BasicLinearProcessNumbered"/>
-    <dgm:cxn modelId="{4E11908F-466D-404D-8F15-E878A5FBB95F}" type="presParOf" srcId="{4F6020D5-6A4B-48DD-B9AC-BB2DDDBBA163}" destId="{56F8E0A7-5430-4B08-8A04-275D8C9D786E}" srcOrd="2" destOrd="0" presId="urn:microsoft.com/office/officeart/2016/7/layout/BasicLinearProcessNumbered"/>
-    <dgm:cxn modelId="{B8127F8A-9951-4E55-B284-1C21B6023553}" type="presParOf" srcId="{4F6020D5-6A4B-48DD-B9AC-BB2DDDBBA163}" destId="{242CBAC2-4EE4-40BC-AC36-E1BA0FA8EAE7}" srcOrd="3" destOrd="0" presId="urn:microsoft.com/office/officeart/2016/7/layout/BasicLinearProcessNumbered"/>
-    <dgm:cxn modelId="{BE4F0B39-B115-4805-AF17-CDA0815EEBBC}" type="presParOf" srcId="{A17326AA-E9C3-4221-9D23-DB9B86BCF806}" destId="{4300E9E7-EB82-476F-880B-E5AC0F9F710B}" srcOrd="1" destOrd="0" presId="urn:microsoft.com/office/officeart/2016/7/layout/BasicLinearProcessNumbered"/>
-    <dgm:cxn modelId="{5CDF3AEB-2F5E-4A69-8B78-CAEE4CD6DC77}" type="presParOf" srcId="{A17326AA-E9C3-4221-9D23-DB9B86BCF806}" destId="{F6EB830B-4CF7-4AE1-A0C8-376E3D2DC4D7}" srcOrd="2" destOrd="0" presId="urn:microsoft.com/office/officeart/2016/7/layout/BasicLinearProcessNumbered"/>
-    <dgm:cxn modelId="{D652A393-7A07-4F44-91D3-EA9019D95651}" type="presParOf" srcId="{F6EB830B-4CF7-4AE1-A0C8-376E3D2DC4D7}" destId="{9EC51152-A9D3-4C02-AFD8-EEA62A989091}" srcOrd="0" destOrd="0" presId="urn:microsoft.com/office/officeart/2016/7/layout/BasicLinearProcessNumbered"/>
-    <dgm:cxn modelId="{F1307DAE-7BB3-4559-A6C0-CF1982C361BC}" type="presParOf" srcId="{F6EB830B-4CF7-4AE1-A0C8-376E3D2DC4D7}" destId="{FF3EC7B0-98C5-4C89-B220-6785684BF4D4}" srcOrd="1" destOrd="0" presId="urn:microsoft.com/office/officeart/2016/7/layout/BasicLinearProcessNumbered"/>
-    <dgm:cxn modelId="{42A2D68B-E448-4BE3-851F-433CF06E4378}" type="presParOf" srcId="{F6EB830B-4CF7-4AE1-A0C8-376E3D2DC4D7}" destId="{1E1828BA-C14C-4131-9488-DD01545000A8}" srcOrd="2" destOrd="0" presId="urn:microsoft.com/office/officeart/2016/7/layout/BasicLinearProcessNumbered"/>
-    <dgm:cxn modelId="{5F45EC3A-0973-44B7-8E96-AFE0D23310A8}" type="presParOf" srcId="{F6EB830B-4CF7-4AE1-A0C8-376E3D2DC4D7}" destId="{0FBF6162-84FB-456C-ACF2-D85E3FD318DF}" srcOrd="3" destOrd="0" presId="urn:microsoft.com/office/officeart/2016/7/layout/BasicLinearProcessNumbered"/>
-    <dgm:cxn modelId="{AFABD8D1-8E80-4E94-9EC8-DDB57FB0B160}" type="presParOf" srcId="{A17326AA-E9C3-4221-9D23-DB9B86BCF806}" destId="{794C246F-47F5-4C4F-92C1-B4445630DA63}" srcOrd="3" destOrd="0" presId="urn:microsoft.com/office/officeart/2016/7/layout/BasicLinearProcessNumbered"/>
-    <dgm:cxn modelId="{90DA61B5-9E15-4A86-845B-D9490F3DBEAC}" type="presParOf" srcId="{A17326AA-E9C3-4221-9D23-DB9B86BCF806}" destId="{DBF86919-E3D0-49AF-B792-EB21CD922E7D}" srcOrd="4" destOrd="0" presId="urn:microsoft.com/office/officeart/2016/7/layout/BasicLinearProcessNumbered"/>
-    <dgm:cxn modelId="{6BCFA7F0-B626-4022-97AA-A8D3A8828984}" type="presParOf" srcId="{DBF86919-E3D0-49AF-B792-EB21CD922E7D}" destId="{C5B24363-5EA1-42BB-A6C0-7AACEE1A0CAD}" srcOrd="0" destOrd="0" presId="urn:microsoft.com/office/officeart/2016/7/layout/BasicLinearProcessNumbered"/>
-    <dgm:cxn modelId="{18C20BCF-A88A-4FCF-AC9C-C673185755B1}" type="presParOf" srcId="{DBF86919-E3D0-49AF-B792-EB21CD922E7D}" destId="{7E892C31-B92D-4746-B58F-7B854516D66E}" srcOrd="1" destOrd="0" presId="urn:microsoft.com/office/officeart/2016/7/layout/BasicLinearProcessNumbered"/>
-    <dgm:cxn modelId="{9E77BCBD-4C3F-4287-A661-F4A892A6585D}" type="presParOf" srcId="{DBF86919-E3D0-49AF-B792-EB21CD922E7D}" destId="{EF8867D2-3109-4C8C-888E-F995D5D9026C}" srcOrd="2" destOrd="0" presId="urn:microsoft.com/office/officeart/2016/7/layout/BasicLinearProcessNumbered"/>
-    <dgm:cxn modelId="{74424ABD-E3E3-471C-9786-9B530C2D1A47}" type="presParOf" srcId="{DBF86919-E3D0-49AF-B792-EB21CD922E7D}" destId="{5F95E2D9-20CE-4142-8D9E-CC0F9F978925}" srcOrd="3" destOrd="0" presId="urn:microsoft.com/office/officeart/2016/7/layout/BasicLinearProcessNumbered"/>
-  </dgm:cxnLst>
-  <dgm:bg/>
-  <dgm:whole/>
-  <dgm:extLst>
-    <a:ext uri="http://schemas.microsoft.com/office/drawing/2008/diagram">
-      <dsp:dataModelExt xmlns:dsp="http://schemas.microsoft.com/office/drawing/2008/diagram" relId="rId6" minVer="http://schemas.openxmlformats.org/drawingml/2006/diagram"/>
-    </a:ext>
-  </dgm:extLst>
-</dgm:dataModel>
-</file>
-
-<file path=ppt/diagrams/drawing1.xml><?xml version="1.0" encoding="utf-8"?>
-<dsp:drawing xmlns:dgm="http://schemas.openxmlformats.org/drawingml/2006/diagram" xmlns:dsp="http://schemas.microsoft.com/office/drawing/2008/diagram" xmlns:a="http://schemas.openxmlformats.org/drawingml/2006/main">
-  <dsp:spTree>
-    <dsp:nvGrpSpPr>
-      <dsp:cNvPr id="0" name=""/>
-      <dsp:cNvGrpSpPr/>
-    </dsp:nvGrpSpPr>
-    <dsp:grpSpPr/>
-    <dsp:sp modelId="{B910C664-21E7-4F50-8BC0-B7B8A4C8AC0F}">
-      <dsp:nvSpPr>
-        <dsp:cNvPr id="0" name=""/>
-        <dsp:cNvSpPr/>
-      </dsp:nvSpPr>
-      <dsp:spPr>
-        <a:xfrm>
-          <a:off x="0" y="0"/>
-          <a:ext cx="3286125" cy="4351338"/>
-        </a:xfrm>
-        <a:prstGeom prst="rect">
-          <a:avLst/>
-        </a:prstGeom>
-        <a:solidFill>
-          <a:schemeClr val="bg1">
-            <a:lumMod val="95000"/>
-            <a:hueOff val="0"/>
-            <a:satOff val="0"/>
-            <a:lumOff val="0"/>
-            <a:alphaOff val="0"/>
-          </a:schemeClr>
-        </a:solidFill>
-        <a:ln w="12700" cap="flat" cmpd="sng" algn="ctr">
-          <a:solidFill>
-            <a:schemeClr val="bg1">
-              <a:lumMod val="95000"/>
-              <a:hueOff val="0"/>
-              <a:satOff val="0"/>
-              <a:lumOff val="0"/>
-              <a:alphaOff val="0"/>
-            </a:schemeClr>
-          </a:solidFill>
-          <a:prstDash val="solid"/>
-          <a:miter lim="800000"/>
-        </a:ln>
-        <a:effectLst/>
-      </dsp:spPr>
-      <dsp:style>
-        <a:lnRef idx="2">
-          <a:scrgbClr r="0" g="0" b="0"/>
-        </a:lnRef>
-        <a:fillRef idx="1">
-          <a:scrgbClr r="0" g="0" b="0"/>
-        </a:fillRef>
-        <a:effectRef idx="0">
-          <a:scrgbClr r="0" g="0" b="0"/>
-        </a:effectRef>
-        <a:fontRef idx="minor"/>
-      </dsp:style>
-      <dsp:txBody>
-        <a:bodyPr spcFirstLastPara="0" vert="horz" wrap="square" lIns="256199" tIns="330200" rIns="256199" bIns="330200" numCol="1" spcCol="1270" anchor="t" anchorCtr="0">
-          <a:noAutofit/>
-        </a:bodyPr>
-        <a:lstStyle/>
-        <a:p>
-          <a:pPr marL="0" lvl="0" indent="0" algn="l" defTabSz="1155700">
-            <a:lnSpc>
-              <a:spcPct val="90000"/>
-            </a:lnSpc>
-            <a:spcBef>
-              <a:spcPct val="0"/>
-            </a:spcBef>
-            <a:spcAft>
-              <a:spcPct val="35000"/>
-            </a:spcAft>
-            <a:buNone/>
-          </a:pPr>
-          <a:r>
-            <a:rPr lang="en-US" sz="2600" kern="1200"/>
-            <a:t>Open up</a:t>
-          </a:r>
-        </a:p>
-        <a:p>
-          <a:pPr marL="228600" lvl="1" indent="-228600" algn="l" defTabSz="889000">
-            <a:lnSpc>
-              <a:spcPct val="90000"/>
-            </a:lnSpc>
-            <a:spcBef>
-              <a:spcPct val="0"/>
-            </a:spcBef>
-            <a:spcAft>
-              <a:spcPct val="15000"/>
-            </a:spcAft>
-            <a:buChar char="•"/>
-          </a:pPr>
-          <a:r>
-            <a:rPr lang="en-US" sz="2000" kern="1200"/>
-            <a:t>Open up the AT_Command_HC-06 ino file</a:t>
-          </a:r>
-        </a:p>
-      </dsp:txBody>
-      <dsp:txXfrm>
-        <a:off x="0" y="1653508"/>
-        <a:ext cx="3286125" cy="2610802"/>
-      </dsp:txXfrm>
-    </dsp:sp>
-    <dsp:sp modelId="{236BCA55-3BDF-4F2A-B2AF-C6F11FC5464C}">
-      <dsp:nvSpPr>
-        <dsp:cNvPr id="0" name=""/>
-        <dsp:cNvSpPr/>
-      </dsp:nvSpPr>
-      <dsp:spPr>
-        <a:xfrm>
-          <a:off x="990361" y="435133"/>
-          <a:ext cx="1305401" cy="1305401"/>
-        </a:xfrm>
-        <a:prstGeom prst="ellipse">
-          <a:avLst/>
-        </a:prstGeom>
-        <a:solidFill>
-          <a:schemeClr val="accent1">
-            <a:hueOff val="0"/>
-            <a:satOff val="0"/>
-            <a:lumOff val="0"/>
-            <a:alphaOff val="0"/>
-          </a:schemeClr>
-        </a:solidFill>
-        <a:ln w="12700" cap="flat" cmpd="sng" algn="ctr">
-          <a:solidFill>
-            <a:schemeClr val="accent1">
-              <a:hueOff val="0"/>
-              <a:satOff val="0"/>
-              <a:lumOff val="0"/>
-              <a:alphaOff val="0"/>
-            </a:schemeClr>
-          </a:solidFill>
-          <a:prstDash val="solid"/>
-          <a:miter lim="800000"/>
-        </a:ln>
-        <a:effectLst/>
-      </dsp:spPr>
-      <dsp:style>
-        <a:lnRef idx="2">
-          <a:scrgbClr r="0" g="0" b="0"/>
-        </a:lnRef>
-        <a:fillRef idx="1">
-          <a:scrgbClr r="0" g="0" b="0"/>
-        </a:fillRef>
-        <a:effectRef idx="0">
-          <a:scrgbClr r="0" g="0" b="0"/>
-        </a:effectRef>
-        <a:fontRef idx="minor">
-          <a:schemeClr val="lt1"/>
-        </a:fontRef>
-      </dsp:style>
-      <dsp:txBody>
-        <a:bodyPr spcFirstLastPara="0" vert="horz" wrap="square" lIns="101774" tIns="12700" rIns="101774" bIns="12700" numCol="1" spcCol="1270" anchor="ctr" anchorCtr="0">
-          <a:noAutofit/>
-        </a:bodyPr>
-        <a:lstStyle/>
-        <a:p>
-          <a:pPr marL="0" lvl="0" indent="0" algn="ctr" defTabSz="2133600">
-            <a:lnSpc>
-              <a:spcPct val="90000"/>
-            </a:lnSpc>
-            <a:spcBef>
-              <a:spcPct val="0"/>
-            </a:spcBef>
-            <a:spcAft>
-              <a:spcPct val="35000"/>
-            </a:spcAft>
-            <a:buNone/>
-          </a:pPr>
-          <a:r>
-            <a:rPr lang="en-US" sz="4800" kern="1200"/>
-            <a:t>1</a:t>
-          </a:r>
-        </a:p>
-      </dsp:txBody>
-      <dsp:txXfrm>
-        <a:off x="1181533" y="626305"/>
-        <a:ext cx="923057" cy="923057"/>
-      </dsp:txXfrm>
-    </dsp:sp>
-    <dsp:sp modelId="{56F8E0A7-5430-4B08-8A04-275D8C9D786E}">
-      <dsp:nvSpPr>
-        <dsp:cNvPr id="0" name=""/>
-        <dsp:cNvSpPr/>
-      </dsp:nvSpPr>
-      <dsp:spPr>
-        <a:xfrm>
-          <a:off x="0" y="4351266"/>
-          <a:ext cx="3286125" cy="72"/>
-        </a:xfrm>
-        <a:prstGeom prst="rect">
-          <a:avLst/>
-        </a:prstGeom>
-        <a:solidFill>
-          <a:schemeClr val="accent1">
-            <a:hueOff val="0"/>
-            <a:satOff val="0"/>
-            <a:lumOff val="0"/>
-            <a:alphaOff val="0"/>
-          </a:schemeClr>
-        </a:solidFill>
-        <a:ln w="12700" cap="flat" cmpd="sng" algn="ctr">
-          <a:solidFill>
-            <a:schemeClr val="accent1">
-              <a:hueOff val="0"/>
-              <a:satOff val="0"/>
-              <a:lumOff val="0"/>
-              <a:alphaOff val="0"/>
-            </a:schemeClr>
-          </a:solidFill>
-          <a:prstDash val="solid"/>
-          <a:miter lim="800000"/>
-        </a:ln>
-        <a:effectLst/>
-      </dsp:spPr>
-      <dsp:style>
-        <a:lnRef idx="2">
-          <a:scrgbClr r="0" g="0" b="0"/>
-        </a:lnRef>
-        <a:fillRef idx="1">
-          <a:scrgbClr r="0" g="0" b="0"/>
-        </a:fillRef>
-        <a:effectRef idx="0">
-          <a:scrgbClr r="0" g="0" b="0"/>
-        </a:effectRef>
-        <a:fontRef idx="minor">
-          <a:schemeClr val="lt1"/>
-        </a:fontRef>
-      </dsp:style>
-    </dsp:sp>
-    <dsp:sp modelId="{9EC51152-A9D3-4C02-AFD8-EEA62A989091}">
-      <dsp:nvSpPr>
-        <dsp:cNvPr id="0" name=""/>
-        <dsp:cNvSpPr/>
-      </dsp:nvSpPr>
-      <dsp:spPr>
-        <a:xfrm>
-          <a:off x="3614737" y="0"/>
-          <a:ext cx="3286125" cy="4351338"/>
-        </a:xfrm>
-        <a:prstGeom prst="rect">
-          <a:avLst/>
-        </a:prstGeom>
-        <a:solidFill>
-          <a:schemeClr val="bg1">
-            <a:lumMod val="95000"/>
-            <a:hueOff val="0"/>
-            <a:satOff val="0"/>
-            <a:lumOff val="0"/>
-            <a:alphaOff val="0"/>
-          </a:schemeClr>
-        </a:solidFill>
-        <a:ln w="12700" cap="flat" cmpd="sng" algn="ctr">
-          <a:solidFill>
-            <a:schemeClr val="bg1">
-              <a:lumMod val="95000"/>
-              <a:hueOff val="0"/>
-              <a:satOff val="0"/>
-              <a:lumOff val="0"/>
-              <a:alphaOff val="0"/>
-            </a:schemeClr>
-          </a:solidFill>
-          <a:prstDash val="solid"/>
-          <a:miter lim="800000"/>
-        </a:ln>
-        <a:effectLst/>
-      </dsp:spPr>
-      <dsp:style>
-        <a:lnRef idx="2">
-          <a:scrgbClr r="0" g="0" b="0"/>
-        </a:lnRef>
-        <a:fillRef idx="1">
-          <a:scrgbClr r="0" g="0" b="0"/>
-        </a:fillRef>
-        <a:effectRef idx="0">
-          <a:scrgbClr r="0" g="0" b="0"/>
-        </a:effectRef>
-        <a:fontRef idx="minor"/>
-      </dsp:style>
-      <dsp:txBody>
-        <a:bodyPr spcFirstLastPara="0" vert="horz" wrap="square" lIns="256199" tIns="330200" rIns="256199" bIns="330200" numCol="1" spcCol="1270" anchor="t" anchorCtr="0">
-          <a:noAutofit/>
-        </a:bodyPr>
-        <a:lstStyle/>
-        <a:p>
-          <a:pPr marL="0" lvl="0" indent="0" algn="l" defTabSz="1155700">
-            <a:lnSpc>
-              <a:spcPct val="90000"/>
-            </a:lnSpc>
-            <a:spcBef>
-              <a:spcPct val="0"/>
-            </a:spcBef>
-            <a:spcAft>
-              <a:spcPct val="35000"/>
-            </a:spcAft>
-            <a:buNone/>
-          </a:pPr>
-          <a:r>
-            <a:rPr lang="en-US" sz="2600" kern="1200"/>
-            <a:t>Read</a:t>
-          </a:r>
-        </a:p>
-        <a:p>
-          <a:pPr marL="228600" lvl="1" indent="-228600" algn="l" defTabSz="889000">
-            <a:lnSpc>
-              <a:spcPct val="90000"/>
-            </a:lnSpc>
-            <a:spcBef>
-              <a:spcPct val="0"/>
-            </a:spcBef>
-            <a:spcAft>
-              <a:spcPct val="15000"/>
-            </a:spcAft>
-            <a:buChar char="•"/>
-          </a:pPr>
-          <a:r>
-            <a:rPr lang="en-US" sz="2000" kern="1200"/>
-            <a:t>Read the instructions carefully before running the program</a:t>
-          </a:r>
-        </a:p>
-      </dsp:txBody>
-      <dsp:txXfrm>
-        <a:off x="3614737" y="1653508"/>
-        <a:ext cx="3286125" cy="2610802"/>
-      </dsp:txXfrm>
-    </dsp:sp>
-    <dsp:sp modelId="{FF3EC7B0-98C5-4C89-B220-6785684BF4D4}">
-      <dsp:nvSpPr>
-        <dsp:cNvPr id="0" name=""/>
-        <dsp:cNvSpPr/>
-      </dsp:nvSpPr>
-      <dsp:spPr>
-        <a:xfrm>
-          <a:off x="4605099" y="435133"/>
-          <a:ext cx="1305401" cy="1305401"/>
-        </a:xfrm>
-        <a:prstGeom prst="ellipse">
-          <a:avLst/>
-        </a:prstGeom>
-        <a:solidFill>
-          <a:schemeClr val="accent1">
-            <a:hueOff val="0"/>
-            <a:satOff val="0"/>
-            <a:lumOff val="0"/>
-            <a:alphaOff val="0"/>
-          </a:schemeClr>
-        </a:solidFill>
-        <a:ln w="12700" cap="flat" cmpd="sng" algn="ctr">
-          <a:solidFill>
-            <a:schemeClr val="accent1">
-              <a:hueOff val="0"/>
-              <a:satOff val="0"/>
-              <a:lumOff val="0"/>
-              <a:alphaOff val="0"/>
-            </a:schemeClr>
-          </a:solidFill>
-          <a:prstDash val="solid"/>
-          <a:miter lim="800000"/>
-        </a:ln>
-        <a:effectLst/>
-      </dsp:spPr>
-      <dsp:style>
-        <a:lnRef idx="2">
-          <a:scrgbClr r="0" g="0" b="0"/>
-        </a:lnRef>
-        <a:fillRef idx="1">
-          <a:scrgbClr r="0" g="0" b="0"/>
-        </a:fillRef>
-        <a:effectRef idx="0">
-          <a:scrgbClr r="0" g="0" b="0"/>
-        </a:effectRef>
-        <a:fontRef idx="minor">
-          <a:schemeClr val="lt1"/>
-        </a:fontRef>
-      </dsp:style>
-      <dsp:txBody>
-        <a:bodyPr spcFirstLastPara="0" vert="horz" wrap="square" lIns="101774" tIns="12700" rIns="101774" bIns="12700" numCol="1" spcCol="1270" anchor="ctr" anchorCtr="0">
-          <a:noAutofit/>
-        </a:bodyPr>
-        <a:lstStyle/>
-        <a:p>
-          <a:pPr marL="0" lvl="0" indent="0" algn="ctr" defTabSz="2133600">
-            <a:lnSpc>
-              <a:spcPct val="90000"/>
-            </a:lnSpc>
-            <a:spcBef>
-              <a:spcPct val="0"/>
-            </a:spcBef>
-            <a:spcAft>
-              <a:spcPct val="35000"/>
-            </a:spcAft>
-            <a:buNone/>
-          </a:pPr>
-          <a:r>
-            <a:rPr lang="en-US" sz="4800" kern="1200"/>
-            <a:t>2</a:t>
-          </a:r>
-        </a:p>
-      </dsp:txBody>
-      <dsp:txXfrm>
-        <a:off x="4796271" y="626305"/>
-        <a:ext cx="923057" cy="923057"/>
-      </dsp:txXfrm>
-    </dsp:sp>
-    <dsp:sp modelId="{1E1828BA-C14C-4131-9488-DD01545000A8}">
-      <dsp:nvSpPr>
-        <dsp:cNvPr id="0" name=""/>
-        <dsp:cNvSpPr/>
-      </dsp:nvSpPr>
-      <dsp:spPr>
-        <a:xfrm>
-          <a:off x="3614737" y="4351266"/>
-          <a:ext cx="3286125" cy="72"/>
-        </a:xfrm>
-        <a:prstGeom prst="rect">
-          <a:avLst/>
-        </a:prstGeom>
-        <a:solidFill>
-          <a:schemeClr val="accent1">
-            <a:hueOff val="0"/>
-            <a:satOff val="0"/>
-            <a:lumOff val="0"/>
-            <a:alphaOff val="0"/>
-          </a:schemeClr>
-        </a:solidFill>
-        <a:ln w="12700" cap="flat" cmpd="sng" algn="ctr">
-          <a:solidFill>
-            <a:schemeClr val="accent1">
-              <a:hueOff val="0"/>
-              <a:satOff val="0"/>
-              <a:lumOff val="0"/>
-              <a:alphaOff val="0"/>
-            </a:schemeClr>
-          </a:solidFill>
-          <a:prstDash val="solid"/>
-          <a:miter lim="800000"/>
-        </a:ln>
-        <a:effectLst/>
-      </dsp:spPr>
-      <dsp:style>
-        <a:lnRef idx="2">
-          <a:scrgbClr r="0" g="0" b="0"/>
-        </a:lnRef>
-        <a:fillRef idx="1">
-          <a:scrgbClr r="0" g="0" b="0"/>
-        </a:fillRef>
-        <a:effectRef idx="0">
-          <a:scrgbClr r="0" g="0" b="0"/>
-        </a:effectRef>
-        <a:fontRef idx="minor">
-          <a:schemeClr val="lt1"/>
-        </a:fontRef>
-      </dsp:style>
-    </dsp:sp>
-    <dsp:sp modelId="{C5B24363-5EA1-42BB-A6C0-7AACEE1A0CAD}">
-      <dsp:nvSpPr>
-        <dsp:cNvPr id="0" name=""/>
-        <dsp:cNvSpPr/>
-      </dsp:nvSpPr>
-      <dsp:spPr>
-        <a:xfrm>
-          <a:off x="7229475" y="0"/>
-          <a:ext cx="3286125" cy="4351338"/>
-        </a:xfrm>
-        <a:prstGeom prst="rect">
-          <a:avLst/>
-        </a:prstGeom>
-        <a:solidFill>
-          <a:schemeClr val="bg1">
-            <a:lumMod val="95000"/>
-            <a:hueOff val="0"/>
-            <a:satOff val="0"/>
-            <a:lumOff val="0"/>
-            <a:alphaOff val="0"/>
-          </a:schemeClr>
-        </a:solidFill>
-        <a:ln w="12700" cap="flat" cmpd="sng" algn="ctr">
-          <a:solidFill>
-            <a:schemeClr val="bg1">
-              <a:lumMod val="95000"/>
-              <a:hueOff val="0"/>
-              <a:satOff val="0"/>
-              <a:lumOff val="0"/>
-              <a:alphaOff val="0"/>
-            </a:schemeClr>
-          </a:solidFill>
-          <a:prstDash val="solid"/>
-          <a:miter lim="800000"/>
-        </a:ln>
-        <a:effectLst/>
-      </dsp:spPr>
-      <dsp:style>
-        <a:lnRef idx="2">
-          <a:scrgbClr r="0" g="0" b="0"/>
-        </a:lnRef>
-        <a:fillRef idx="1">
-          <a:scrgbClr r="0" g="0" b="0"/>
-        </a:fillRef>
-        <a:effectRef idx="0">
-          <a:scrgbClr r="0" g="0" b="0"/>
-        </a:effectRef>
-        <a:fontRef idx="minor"/>
-      </dsp:style>
-      <dsp:txBody>
-        <a:bodyPr spcFirstLastPara="0" vert="horz" wrap="square" lIns="256199" tIns="330200" rIns="256199" bIns="330200" numCol="1" spcCol="1270" anchor="t" anchorCtr="0">
-          <a:noAutofit/>
-        </a:bodyPr>
-        <a:lstStyle/>
-        <a:p>
-          <a:pPr marL="0" lvl="0" indent="0" algn="l" defTabSz="1155700">
-            <a:lnSpc>
-              <a:spcPct val="90000"/>
-            </a:lnSpc>
-            <a:spcBef>
-              <a:spcPct val="0"/>
-            </a:spcBef>
-            <a:spcAft>
-              <a:spcPct val="35000"/>
-            </a:spcAft>
-            <a:buNone/>
-          </a:pPr>
-          <a:r>
-            <a:rPr lang="en-US" sz="2600" kern="1200"/>
-            <a:t>Refer</a:t>
-          </a:r>
-        </a:p>
-        <a:p>
-          <a:pPr marL="228600" lvl="1" indent="-228600" algn="l" defTabSz="889000">
-            <a:lnSpc>
-              <a:spcPct val="90000"/>
-            </a:lnSpc>
-            <a:spcBef>
-              <a:spcPct val="0"/>
-            </a:spcBef>
-            <a:spcAft>
-              <a:spcPct val="15000"/>
-            </a:spcAft>
-            <a:buChar char="•"/>
-          </a:pPr>
-          <a:r>
-            <a:rPr lang="en-US" sz="2000" kern="1200" dirty="0"/>
-            <a:t>Refer to the next two slides for more information regarding the AT Command of HC-06.</a:t>
-          </a:r>
-        </a:p>
-      </dsp:txBody>
-      <dsp:txXfrm>
-        <a:off x="7229475" y="1653508"/>
-        <a:ext cx="3286125" cy="2610802"/>
-      </dsp:txXfrm>
-    </dsp:sp>
-    <dsp:sp modelId="{7E892C31-B92D-4746-B58F-7B854516D66E}">
-      <dsp:nvSpPr>
-        <dsp:cNvPr id="0" name=""/>
-        <dsp:cNvSpPr/>
-      </dsp:nvSpPr>
-      <dsp:spPr>
-        <a:xfrm>
-          <a:off x="8219836" y="435133"/>
-          <a:ext cx="1305401" cy="1305401"/>
-        </a:xfrm>
-        <a:prstGeom prst="ellipse">
-          <a:avLst/>
-        </a:prstGeom>
-        <a:solidFill>
-          <a:schemeClr val="accent1">
-            <a:hueOff val="0"/>
-            <a:satOff val="0"/>
-            <a:lumOff val="0"/>
-            <a:alphaOff val="0"/>
-          </a:schemeClr>
-        </a:solidFill>
-        <a:ln w="12700" cap="flat" cmpd="sng" algn="ctr">
-          <a:solidFill>
-            <a:schemeClr val="accent1">
-              <a:hueOff val="0"/>
-              <a:satOff val="0"/>
-              <a:lumOff val="0"/>
-              <a:alphaOff val="0"/>
-            </a:schemeClr>
-          </a:solidFill>
-          <a:prstDash val="solid"/>
-          <a:miter lim="800000"/>
-        </a:ln>
-        <a:effectLst/>
-      </dsp:spPr>
-      <dsp:style>
-        <a:lnRef idx="2">
-          <a:scrgbClr r="0" g="0" b="0"/>
-        </a:lnRef>
-        <a:fillRef idx="1">
-          <a:scrgbClr r="0" g="0" b="0"/>
-        </a:fillRef>
-        <a:effectRef idx="0">
-          <a:scrgbClr r="0" g="0" b="0"/>
-        </a:effectRef>
-        <a:fontRef idx="minor">
-          <a:schemeClr val="lt1"/>
-        </a:fontRef>
-      </dsp:style>
-      <dsp:txBody>
-        <a:bodyPr spcFirstLastPara="0" vert="horz" wrap="square" lIns="101774" tIns="12700" rIns="101774" bIns="12700" numCol="1" spcCol="1270" anchor="ctr" anchorCtr="0">
-          <a:noAutofit/>
-        </a:bodyPr>
-        <a:lstStyle/>
-        <a:p>
-          <a:pPr marL="0" lvl="0" indent="0" algn="ctr" defTabSz="2133600">
-            <a:lnSpc>
-              <a:spcPct val="90000"/>
-            </a:lnSpc>
-            <a:spcBef>
-              <a:spcPct val="0"/>
-            </a:spcBef>
-            <a:spcAft>
-              <a:spcPct val="35000"/>
-            </a:spcAft>
-            <a:buNone/>
-          </a:pPr>
-          <a:r>
-            <a:rPr lang="en-US" sz="4800" kern="1200"/>
-            <a:t>3</a:t>
-          </a:r>
-        </a:p>
-      </dsp:txBody>
-      <dsp:txXfrm>
-        <a:off x="8411008" y="626305"/>
-        <a:ext cx="923057" cy="923057"/>
-      </dsp:txXfrm>
-    </dsp:sp>
-    <dsp:sp modelId="{EF8867D2-3109-4C8C-888E-F995D5D9026C}">
-      <dsp:nvSpPr>
-        <dsp:cNvPr id="0" name=""/>
-        <dsp:cNvSpPr/>
-      </dsp:nvSpPr>
-      <dsp:spPr>
-        <a:xfrm>
-          <a:off x="7229475" y="4351266"/>
-          <a:ext cx="3286125" cy="72"/>
-        </a:xfrm>
-        <a:prstGeom prst="rect">
-          <a:avLst/>
-        </a:prstGeom>
-        <a:solidFill>
-          <a:schemeClr val="accent1">
-            <a:hueOff val="0"/>
-            <a:satOff val="0"/>
-            <a:lumOff val="0"/>
-            <a:alphaOff val="0"/>
-          </a:schemeClr>
-        </a:solidFill>
-        <a:ln w="12700" cap="flat" cmpd="sng" algn="ctr">
-          <a:solidFill>
-            <a:schemeClr val="accent1">
-              <a:hueOff val="0"/>
-              <a:satOff val="0"/>
-              <a:lumOff val="0"/>
-              <a:alphaOff val="0"/>
-            </a:schemeClr>
-          </a:solidFill>
-          <a:prstDash val="solid"/>
-          <a:miter lim="800000"/>
-        </a:ln>
-        <a:effectLst/>
-      </dsp:spPr>
-      <dsp:style>
-        <a:lnRef idx="2">
-          <a:scrgbClr r="0" g="0" b="0"/>
-        </a:lnRef>
-        <a:fillRef idx="1">
-          <a:scrgbClr r="0" g="0" b="0"/>
-        </a:fillRef>
-        <a:effectRef idx="0">
-          <a:scrgbClr r="0" g="0" b="0"/>
-        </a:effectRef>
-        <a:fontRef idx="minor">
-          <a:schemeClr val="lt1"/>
-        </a:fontRef>
-      </dsp:style>
-    </dsp:sp>
-  </dsp:spTree>
-</dsp:drawing>
-</file>
-
-<file path=ppt/diagrams/layout1.xml><?xml version="1.0" encoding="utf-8"?>
-<dgm:layoutDef xmlns:dgm="http://schemas.openxmlformats.org/drawingml/2006/diagram" xmlns:a="http://schemas.openxmlformats.org/drawingml/2006/main" uniqueId="urn:microsoft.com/office/officeart/2016/7/layout/BasicLinearProcessNumbered">
-  <dgm:title val="Basic Linear Process Numbered"/>
-  <dgm:desc val="Used to show a progression; a timeline; sequential steps in a task, process, or workflow; or to emphasize movement or direction. Automatic numbers have been introduced to show the steps of the process which appears in a circle. Level 1 and Level 2 text appear in a rectangle."/>
-  <dgm:catLst>
-    <dgm:cat type="process" pri="500"/>
-  </dgm:catLst>
-  <dgm:sampData>
-    <dgm:dataModel>
-      <dgm:ptLst>
-        <dgm:pt modelId="0" type="doc"/>
-        <dgm:pt modelId="1">
-          <dgm:prSet phldr="1"/>
-        </dgm:pt>
-        <dgm:pt modelId="11">
-          <dgm:prSet phldr="1"/>
-        </dgm:pt>
-        <dgm:pt modelId="2">
-          <dgm:prSet phldr="1"/>
-        </dgm:pt>
-        <dgm:pt modelId="21">
-          <dgm:prSet phldr="1"/>
-        </dgm:pt>
-        <dgm:pt modelId="3">
-          <dgm:prSet phldr="1"/>
-        </dgm:pt>
-        <dgm:pt modelId="31">
-          <dgm:prSet phldr="1"/>
-        </dgm:pt>
-        <dgm:pt modelId="101" type="sibTrans" cxnId="4">
-          <dgm:prSet phldrT="1"/>
-          <dgm:t>
-            <a:bodyPr/>
-            <a:lstStyle/>
-            <a:p>
-              <a:r>
-                <a:t>1</a:t>
-              </a:r>
-            </a:p>
-          </dgm:t>
-        </dgm:pt>
-        <dgm:pt modelId="201" type="sibTrans" cxnId="5">
-          <dgm:prSet phldrT="2"/>
-          <dgm:t>
-            <a:bodyPr/>
-            <a:lstStyle/>
-            <a:p>
-              <a:r>
-                <a:t>2</a:t>
-              </a:r>
-            </a:p>
-          </dgm:t>
-        </dgm:pt>
-        <dgm:pt modelId="301" type="sibTrans" cxnId="6">
-          <dgm:prSet phldrT="3"/>
-          <dgm:t>
-            <a:bodyPr/>
-            <a:lstStyle/>
-            <a:p>
-              <a:r>
-                <a:t>3</a:t>
-              </a:r>
-            </a:p>
-          </dgm:t>
-        </dgm:pt>
-      </dgm:ptLst>
-      <dgm:cxnLst>
-        <dgm:cxn modelId="4" srcId="0" destId="1" srcOrd="0" destOrd="0" sibTransId="101"/>
-        <dgm:cxn modelId="5" srcId="0" destId="2" srcOrd="1" destOrd="0" sibTransId="201"/>
-        <dgm:cxn modelId="6" srcId="0" destId="3" srcOrd="2" destOrd="0" sibTransId="301"/>
-        <dgm:cxn modelId="13" srcId="1" destId="11" srcOrd="0" destOrd="0"/>
-        <dgm:cxn modelId="23" srcId="2" destId="21" srcOrd="0" destOrd="0"/>
-        <dgm:cxn modelId="33" srcId="3" destId="31" srcOrd="0" destOrd="0"/>
-      </dgm:cxnLst>
-      <dgm:bg/>
-      <dgm:whole/>
-    </dgm:dataModel>
-  </dgm:sampData>
-  <dgm:styleData>
-    <dgm:dataModel>
-      <dgm:ptLst>
-        <dgm:pt modelId="0" type="doc"/>
-        <dgm:pt modelId="1"/>
-        <dgm:pt modelId="11"/>
-        <dgm:pt modelId="2"/>
-        <dgm:pt modelId="21"/>
-      </dgm:ptLst>
-      <dgm:cxnLst>
-        <dgm:cxn modelId="4" srcId="0" destId="1" srcOrd="0" destOrd="0"/>
-        <dgm:cxn modelId="5" srcId="0" destId="2" srcOrd="1" destOrd="0"/>
-        <dgm:cxn modelId="13" srcId="1" destId="11" srcOrd="0" destOrd="0"/>
-        <dgm:cxn modelId="23" srcId="2" destId="21" srcOrd="0" destOrd="0"/>
-      </dgm:cxnLst>
-      <dgm:bg/>
-      <dgm:whole/>
-    </dgm:dataModel>
-  </dgm:styleData>
-  <dgm:clrData>
-    <dgm:dataModel>
-      <dgm:ptLst>
-        <dgm:pt modelId="0" type="doc"/>
-        <dgm:pt modelId="1"/>
-        <dgm:pt modelId="11"/>
-        <dgm:pt modelId="2"/>
-        <dgm:pt modelId="21"/>
-        <dgm:pt modelId="3"/>
-        <dgm:pt modelId="31"/>
-        <dgm:pt modelId="4"/>
-        <dgm:pt modelId="41"/>
-      </dgm:ptLst>
-      <dgm:cxnLst>
-        <dgm:cxn modelId="5" srcId="0" destId="1" srcOrd="0" destOrd="0"/>
-        <dgm:cxn modelId="6" srcId="0" destId="2" srcOrd="1" destOrd="0"/>
-        <dgm:cxn modelId="7" srcId="0" destId="3" srcOrd="2" destOrd="0"/>
-        <dgm:cxn modelId="8" srcId="0" destId="4" srcOrd="3" destOrd="0"/>
-        <dgm:cxn modelId="13" srcId="1" destId="11" srcOrd="0" destOrd="0"/>
-        <dgm:cxn modelId="23" srcId="2" destId="21" srcOrd="0" destOrd="0"/>
-        <dgm:cxn modelId="33" srcId="3" destId="31" srcOrd="0" destOrd="0"/>
-        <dgm:cxn modelId="43" srcId="4" destId="41" srcOrd="0" destOrd="0"/>
-      </dgm:cxnLst>
-      <dgm:bg/>
-      <dgm:whole/>
-    </dgm:dataModel>
-  </dgm:clrData>
-  <dgm:layoutNode name="Name0">
-    <dgm:varLst>
-      <dgm:animLvl val="lvl"/>
-      <dgm:resizeHandles val="exact"/>
-    </dgm:varLst>
-    <dgm:alg type="lin">
-      <dgm:param type="linDir" val="fromL"/>
-      <dgm:param type="nodeVertAlign" val="t"/>
-    </dgm:alg>
-    <dgm:shape xmlns:r="http://schemas.openxmlformats.org/officeDocument/2006/relationships" r:blip="">
-      <dgm:adjLst/>
-    </dgm:shape>
-    <dgm:presOf/>
-    <dgm:constrLst>
-      <dgm:constr type="h" for="ch" forName="compositeNode" refType="h"/>
-      <dgm:constr type="w" for="ch" forName="compositeNode" refType="w"/>
-      <dgm:constr type="w" for="des" forName="simulatedConn" refType="w" refFor="ch" refForName="compositeNode" fact="0.15"/>
-      <dgm:constr type="h" for="des" forName="simulatedConn" refType="w" refFor="des" refForName="simulatedConn"/>
-      <dgm:constr type="h" for="des" forName="vSp1" refType="w" refFor="ch" refForName="compositeNode" fact="0.8"/>
-      <dgm:constr type="h" for="des" forName="vSp2" refType="w" refFor="ch" refForName="compositeNode" fact="0.07"/>
-      <dgm:constr type="w" for="ch" forName="vProcSp" refType="w" refFor="des" refForName="simulatedConn" op="equ"/>
-      <dgm:constr type="h" for="ch" forName="vProcSp" refType="h" refFor="ch" refForName="compositeNode" op="equ"/>
-      <dgm:constr type="w" for="ch" forName="sibTrans" refType="w" refFor="ch" refForName="compositeNode" fact="0.1"/>
-      <dgm:constr type="primFontSz" for="des" forName="sibTransNodeCircle" op="equ"/>
-      <dgm:constr type="primFontSz" for="des" forName="nodeText" op="equ"/>
-      <dgm:constr type="h" for="des" forName="sibTransNodeCircle" op="equ"/>
-      <dgm:constr type="w" for="des" forName="sibTransNodeCircle" op="equ"/>
-    </dgm:constrLst>
-    <dgm:ruleLst>
-      <dgm:rule type="h" val="NaN" fact="1.2" max="NaN"/>
-    </dgm:ruleLst>
-    <dgm:forEach name="Name4" axis="ch" ptType="node">
-      <dgm:layoutNode name="compositeNode">
-        <dgm:varLst>
-          <dgm:bulletEnabled val="1"/>
-        </dgm:varLst>
-        <dgm:alg type="composite"/>
-        <dgm:constrLst>
-          <dgm:constr type="h" refType="w" op="lte" fact="1.4"/>
-          <dgm:constr type="w" for="ch" forName="bgRect" refType="w"/>
-          <dgm:constr type="h" for="ch" forName="bgRect" refType="h"/>
-          <dgm:constr type="t" for="ch" forName="bgRect"/>
-          <dgm:constr type="l" for="ch" forName="bgRect"/>
-          <dgm:constr type="h" for="ch" forName="sibTransNodeCircle" refType="h" refFor="ch" refForName="bgRect" fact="0.3"/>
-          <dgm:constr type="w" for="ch" forName="sibTransNodeCircle" refType="h" refFor="ch" refForName="sibTransNodeCircle"/>
-          <dgm:constr type="ctrX" for="ch" forName="sibTransNodeCircle" refType="w" fact="0.5"/>
-          <dgm:constr type="ctrY" for="ch" forName="sibTransNodeCircle" refType="h" fact="0.25"/>
-          <dgm:constr type="r" for="ch" forName="nodeText" refType="r" refFor="ch" refForName="bgRect"/>
-          <dgm:constr type="h" for="ch" forName="nodeText" refType="h" refFor="ch" refForName="bgRect" fact="0.6"/>
-          <dgm:constr type="t" for="ch" forName="nodeText" refType="h" refFor="ch" refForName="bgRect" fact="0.38"/>
-          <dgm:constr type="b" for="ch" forName="bottomLine" refType="b" refFor="ch" refForName="bgRect"/>
-          <dgm:constr type="w" for="ch" forName="bottomLine" refType="w" refFor="ch" refForName="bgRect"/>
-          <dgm:constr type="h" for="ch" forName="bottomLine" val="0.002"/>
-        </dgm:constrLst>
-        <dgm:ruleLst/>
-        <dgm:layoutNode name="bgRect" styleLbl="bgAccFollowNode1">
-          <dgm:alg type="sp"/>
-          <dgm:shape xmlns:r="http://schemas.openxmlformats.org/officeDocument/2006/relationships" type="rect" r:blip="">
-            <dgm:adjLst/>
-          </dgm:shape>
-          <dgm:presOf axis="self"/>
-          <dgm:constrLst/>
-          <dgm:ruleLst/>
-        </dgm:layoutNode>
-        <dgm:forEach name="Name19" axis="followSib" ptType="sibTrans" hideLastTrans="0" cnt="1">
-          <dgm:layoutNode name="sibTransNodeCircle" styleLbl="alignNode1">
-            <dgm:varLst>
-              <dgm:chMax val="0"/>
-              <dgm:bulletEnabled/>
-            </dgm:varLst>
-            <dgm:presOf axis="self" ptType="sibTrans"/>
-            <dgm:alg type="tx">
-              <dgm:param type="txAnchorVert" val="mid"/>
-              <dgm:param type="txAnchorHorzCh" val="ctr"/>
-            </dgm:alg>
-            <dgm:shape xmlns:r="http://schemas.openxmlformats.org/officeDocument/2006/relationships" type="ellipse" r:blip="">
-              <dgm:adjLst/>
-            </dgm:shape>
-            <dgm:constrLst>
-              <dgm:constr type="w" refType="h" op="lte"/>
-              <dgm:constr type="primFontSz" val="48"/>
-              <dgm:constr type="tMarg" val="1"/>
-              <dgm:constr type="lMarg" refType="w" fact="0.221"/>
-              <dgm:constr type="rMarg" refType="w" fact="0.221"/>
-              <dgm:constr type="bMarg" val="1"/>
-            </dgm:constrLst>
-            <dgm:ruleLst>
-              <dgm:rule type="primFontSz" val="14" fact="NaN" max="NaN"/>
-            </dgm:ruleLst>
-          </dgm:layoutNode>
-        </dgm:forEach>
-        <dgm:layoutNode name="bottomLine" styleLbl="alignNode1">
-          <dgm:varLst/>
-          <dgm:presOf/>
-          <dgm:alg type="sp"/>
-          <dgm:shape xmlns:r="http://schemas.openxmlformats.org/officeDocument/2006/relationships" type="rect" r:blip="">
-            <dgm:adjLst/>
-          </dgm:shape>
-          <dgm:constrLst/>
-          <dgm:ruleLst/>
-        </dgm:layoutNode>
-        <dgm:layoutNode name="nodeText" styleLbl="bgAccFollowNode1" moveWith="bgRect">
-          <dgm:varLst>
-            <dgm:bulletEnabled val="1"/>
-          </dgm:varLst>
-          <dgm:alg type="tx">
-            <dgm:param type="parTxLTRAlign" val="l"/>
-            <dgm:param type="parTxRTLAlign" val="r"/>
-            <dgm:param type="txAnchorVert" val="t"/>
-          </dgm:alg>
-          <dgm:shape xmlns:r="http://schemas.openxmlformats.org/officeDocument/2006/relationships" type="rect" r:blip="" zOrderOff="-1" hideGeom="1">
-            <dgm:adjLst/>
-          </dgm:shape>
-          <dgm:presOf axis="desOrSelf" ptType="node"/>
-          <dgm:constrLst>
-            <dgm:constr type="primFontSz" val="26"/>
-            <dgm:constr type="tMarg" val="26"/>
-            <dgm:constr type="lMarg" refType="w" fact="0.221"/>
-            <dgm:constr type="rMarg" refType="w" fact="0.221"/>
-            <dgm:constr type="bMarg" val="26"/>
-          </dgm:constrLst>
-          <dgm:ruleLst>
-            <dgm:rule type="primFontSz" val="11" fact="NaN" max="NaN"/>
-          </dgm:ruleLst>
-        </dgm:layoutNode>
-      </dgm:layoutNode>
-      <dgm:forEach name="Name14" axis="followSib" ptType="sibTrans" cnt="1">
-        <dgm:layoutNode name="sibTrans">
-          <dgm:alg type="sp"/>
-          <dgm:shape xmlns:r="http://schemas.openxmlformats.org/officeDocument/2006/relationships" r:blip="">
-            <dgm:adjLst/>
-          </dgm:shape>
-          <dgm:presOf/>
-          <dgm:constrLst/>
-          <dgm:ruleLst/>
-        </dgm:layoutNode>
-      </dgm:forEach>
-    </dgm:forEach>
-  </dgm:layoutNode>
-  <dgm:extLst>
-    <a:ext uri="{4F341089-5ED1-44EC-B178-C955D00A3D55}">
-      <dgm1611:autoBuNodeInfoLst xmlns:dgm1611="http://schemas.microsoft.com/office/drawing/2016/11/diagram">
-        <dgm1611:autoBuNodeInfo lvl="1" ptType="sibTrans">
-          <dgm1611:buPr prefix="" leadZeros="0">
-            <a:buAutoNum type="arabicParenBoth"/>
-          </dgm1611:buPr>
-        </dgm1611:autoBuNodeInfo>
-      </dgm1611:autoBuNodeInfoLst>
-    </a:ext>
-  </dgm:extLst>
-</dgm:layoutDef>
-</file>
-
-<file path=ppt/diagrams/quickStyle1.xml><?xml version="1.0" encoding="utf-8"?>
-<dgm:styleDef xmlns:dgm="http://schemas.openxmlformats.org/drawingml/2006/diagram" xmlns:a="http://schemas.openxmlformats.org/drawingml/2006/main" uniqueId="urn:microsoft.com/office/officeart/2005/8/quickstyle/simple1">
-  <dgm:title val=""/>
-  <dgm:desc val=""/>
-  <dgm:catLst>
-    <dgm:cat type="simple" pri="10100"/>
-  </dgm:catLst>
-  <dgm:scene3d>
-    <a:camera prst="orthographicFront"/>
-    <a:lightRig rig="threePt" dir="t"/>
-  </dgm:scene3d>
-  <dgm:styleLbl name="node0">
-    <dgm:scene3d>
-      <a:camera prst="orthographicFront"/>
-      <a:lightRig rig="threePt" dir="t"/>
-    </dgm:scene3d>
-    <dgm:sp3d/>
-    <dgm:txPr/>
-    <dgm:style>
-      <a:lnRef idx="2">
-        <a:scrgbClr r="0" g="0" b="0"/>
-      </a:lnRef>
-      <a:fillRef idx="1">
-        <a:scrgbClr r="0" g="0" b="0"/>
-      </a:fillRef>
-      <a:effectRef idx="0">
-        <a:scrgbClr r="0" g="0" b="0"/>
-      </a:effectRef>
-      <a:fontRef idx="minor">
-        <a:schemeClr val="lt1"/>
-      </a:fontRef>
-    </dgm:style>
-  </dgm:styleLbl>
-  <dgm:styleLbl name="lnNode1">
-    <dgm:scene3d>
-      <a:camera prst="orthographicFront"/>
-      <a:lightRig rig="threePt" dir="t"/>
-    </dgm:scene3d>
-    <dgm:sp3d/>
-    <dgm:txPr/>
-    <dgm:style>
-      <a:lnRef idx="2">
-        <a:scrgbClr r="0" g="0" b="0"/>
-      </a:lnRef>
-      <a:fillRef idx="1">
-        <a:scrgbClr r="0" g="0" b="0"/>
-      </a:fillRef>
-      <a:effectRef idx="0">
-        <a:scrgbClr r="0" g="0" b="0"/>
-      </a:effectRef>
-      <a:fontRef idx="minor">
-        <a:schemeClr val="lt1"/>
-      </a:fontRef>
-    </dgm:style>
-  </dgm:styleLbl>
-  <dgm:styleLbl name="vennNode1">
-    <dgm:scene3d>
-      <a:camera prst="orthographicFront"/>
-      <a:lightRig rig="threePt" dir="t"/>
-    </dgm:scene3d>
-    <dgm:sp3d/>
-    <dgm:txPr/>
-    <dgm:style>
-      <a:lnRef idx="2">
-        <a:scrgbClr r="0" g="0" b="0"/>
-      </a:lnRef>
-      <a:fillRef idx="1">
-        <a:scrgbClr r="0" g="0" b="0"/>
-      </a:fillRef>
-      <a:effectRef idx="0">
-        <a:scrgbClr r="0" g="0" b="0"/>
-      </a:effectRef>
-      <a:fontRef idx="minor">
-        <a:schemeClr val="tx1"/>
-      </a:fontRef>
-    </dgm:style>
-  </dgm:styleLbl>
-  <dgm:styleLbl name="alignNode1">
-    <dgm:scene3d>
-      <a:camera prst="orthographicFront"/>
-      <a:lightRig rig="threePt" dir="t"/>
-    </dgm:scene3d>
-    <dgm:sp3d/>
-    <dgm:txPr/>
-    <dgm:style>
-      <a:lnRef idx="2">
-        <a:scrgbClr r="0" g="0" b="0"/>
-      </a:lnRef>
-      <a:fillRef idx="1">
-        <a:scrgbClr r="0" g="0" b="0"/>
-      </a:fillRef>
-      <a:effectRef idx="0">
-        <a:scrgbClr r="0" g="0" b="0"/>
-      </a:effectRef>
-      <a:fontRef idx="minor">
-        <a:schemeClr val="lt1"/>
-      </a:fontRef>
-    </dgm:style>
-  </dgm:styleLbl>
-  <dgm:styleLbl name="node1">
-    <dgm:scene3d>
-      <a:camera prst="orthographicFront"/>
-      <a:lightRig rig="threePt" dir="t"/>
-    </dgm:scene3d>
-    <dgm:sp3d/>
-    <dgm:txPr/>
-    <dgm:style>
-      <a:lnRef idx="2">
-        <a:scrgbClr r="0" g="0" b="0"/>
-      </a:lnRef>
-      <a:fillRef idx="1">
-        <a:scrgbClr r="0" g="0" b="0"/>
-      </a:fillRef>
-      <a:effectRef idx="0">
-        <a:scrgbClr r="0" g="0" b="0"/>
-      </a:effectRef>
-      <a:fontRef idx="minor">
-        <a:schemeClr val="lt1"/>
-      </a:fontRef>
-    </dgm:style>
-  </dgm:styleLbl>
-  <dgm:styleLbl name="node2">
-    <dgm:scene3d>
-      <a:camera prst="orthographicFront"/>
-      <a:lightRig rig="threePt" dir="t"/>
-    </dgm:scene3d>
-    <dgm:sp3d/>
-    <dgm:txPr/>
-    <dgm:style>
-      <a:lnRef idx="2">
-        <a:scrgbClr r="0" g="0" b="0"/>
-      </a:lnRef>
-      <a:fillRef idx="1">
-        <a:scrgbClr r="0" g="0" b="0"/>
-      </a:fillRef>
-      <a:effectRef idx="0">
-        <a:scrgbClr r="0" g="0" b="0"/>
-      </a:effectRef>
-      <a:fontRef idx="minor">
-        <a:schemeClr val="lt1"/>
-      </a:fontRef>
-    </dgm:style>
-  </dgm:styleLbl>
-  <dgm:styleLbl name="node3">
-    <dgm:scene3d>
-      <a:camera prst="orthographicFront"/>
-      <a:lightRig rig="threePt" dir="t"/>
-    </dgm:scene3d>
-    <dgm:sp3d/>
-    <dgm:txPr/>
-    <dgm:style>
-      <a:lnRef idx="2">
-        <a:scrgbClr r="0" g="0" b="0"/>
-      </a:lnRef>
-      <a:fillRef idx="1">
-        <a:scrgbClr r="0" g="0" b="0"/>
-      </a:fillRef>
-      <a:effectRef idx="0">
-        <a:scrgbClr r="0" g="0" b="0"/>
-      </a:effectRef>
-      <a:fontRef idx="minor">
-        <a:schemeClr val="lt1"/>
-      </a:fontRef>
-    </dgm:style>
-  </dgm:styleLbl>
-  <dgm:styleLbl name="node4">
-    <dgm:scene3d>
-      <a:camera prst="orthographicFront"/>
-      <a:lightRig rig="threePt" dir="t"/>
-    </dgm:scene3d>
-    <dgm:sp3d/>
-    <dgm:txPr/>
-    <dgm:style>
-      <a:lnRef idx="2">
-        <a:scrgbClr r="0" g="0" b="0"/>
-      </a:lnRef>
-      <a:fillRef idx="1">
-        <a:scrgbClr r="0" g="0" b="0"/>
-      </a:fillRef>
-      <a:effectRef idx="0">
-        <a:scrgbClr r="0" g="0" b="0"/>
-      </a:effectRef>
-      <a:fontRef idx="minor">
-        <a:schemeClr val="lt1"/>
-      </a:fontRef>
-    </dgm:style>
-  </dgm:styleLbl>
-  <dgm:styleLbl name="fgImgPlace1">
-    <dgm:scene3d>
-      <a:camera prst="orthographicFront"/>
-      <a:lightRig rig="threePt" dir="t"/>
-    </dgm:scene3d>
-    <dgm:sp3d/>
-    <dgm:txPr/>
-    <dgm:style>
-      <a:lnRef idx="2">
-        <a:scrgbClr r="0" g="0" b="0"/>
-      </a:lnRef>
-      <a:fillRef idx="1">
-        <a:scrgbClr r="0" g="0" b="0"/>
-      </a:fillRef>
-      <a:effectRef idx="0">
-        <a:scrgbClr r="0" g="0" b="0"/>
-      </a:effectRef>
-      <a:fontRef idx="minor"/>
-    </dgm:style>
-  </dgm:styleLbl>
-  <dgm:styleLbl name="alignImgPlace1">
-    <dgm:scene3d>
-      <a:camera prst="orthographicFront"/>
-      <a:lightRig rig="threePt" dir="t"/>
-    </dgm:scene3d>
-    <dgm:sp3d/>
-    <dgm:txPr/>
-    <dgm:style>
-      <a:lnRef idx="2">
-        <a:scrgbClr r="0" g="0" b="0"/>
-      </a:lnRef>
-      <a:fillRef idx="1">
-        <a:scrgbClr r="0" g="0" b="0"/>
-      </a:fillRef>
-      <a:effectRef idx="0">
-        <a:scrgbClr r="0" g="0" b="0"/>
-      </a:effectRef>
-      <a:fontRef idx="minor"/>
-    </dgm:style>
-  </dgm:styleLbl>
-  <dgm:styleLbl name="bgImgPlace1">
-    <dgm:scene3d>
-      <a:camera prst="orthographicFront"/>
-      <a:lightRig rig="threePt" dir="t"/>
-    </dgm:scene3d>
-    <dgm:sp3d/>
-    <dgm:txPr/>
-    <dgm:style>
-      <a:lnRef idx="2">
-        <a:scrgbClr r="0" g="0" b="0"/>
-      </a:lnRef>
-      <a:fillRef idx="1">
-        <a:scrgbClr r="0" g="0" b="0"/>
-      </a:fillRef>
-      <a:effectRef idx="0">
-        <a:scrgbClr r="0" g="0" b="0"/>
-      </a:effectRef>
-      <a:fontRef idx="minor"/>
-    </dgm:style>
-  </dgm:styleLbl>
-  <dgm:styleLbl name="sibTrans2D1">
-    <dgm:scene3d>
-      <a:camera prst="orthographicFront"/>
-      <a:lightRig rig="threePt" dir="t"/>
-    </dgm:scene3d>
-    <dgm:sp3d/>
-    <dgm:txPr/>
-    <dgm:style>
-      <a:lnRef idx="0">
-        <a:scrgbClr r="0" g="0" b="0"/>
-      </a:lnRef>
-      <a:fillRef idx="1">
-        <a:scrgbClr r="0" g="0" b="0"/>
-      </a:fillRef>
-      <a:effectRef idx="0">
-        <a:scrgbClr r="0" g="0" b="0"/>
-      </a:effectRef>
-      <a:fontRef idx="minor">
-        <a:schemeClr val="lt1"/>
-      </a:fontRef>
-    </dgm:style>
-  </dgm:styleLbl>
-  <dgm:styleLbl name="fgSibTrans2D1">
-    <dgm:scene3d>
-      <a:camera prst="orthographicFront"/>
-      <a:lightRig rig="threePt" dir="t"/>
-    </dgm:scene3d>
-    <dgm:sp3d/>
-    <dgm:txPr/>
-    <dgm:style>
-      <a:lnRef idx="0">
-        <a:scrgbClr r="0" g="0" b="0"/>
-      </a:lnRef>
-      <a:fillRef idx="1">
-        <a:scrgbClr r="0" g="0" b="0"/>
-      </a:fillRef>
-      <a:effectRef idx="0">
-        <a:scrgbClr r="0" g="0" b="0"/>
-      </a:effectRef>
-      <a:fontRef idx="minor">
-        <a:schemeClr val="lt1"/>
-      </a:fontRef>
-    </dgm:style>
-  </dgm:styleLbl>
-  <dgm:styleLbl name="bgSibTrans2D1">
-    <dgm:scene3d>
-      <a:camera prst="orthographicFront"/>
-      <a:lightRig rig="threePt" dir="t"/>
-    </dgm:scene3d>
-    <dgm:sp3d/>
-    <dgm:txPr/>
-    <dgm:style>
-      <a:lnRef idx="0">
-        <a:scrgbClr r="0" g="0" b="0"/>
-      </a:lnRef>
-      <a:fillRef idx="1">
-        <a:scrgbClr r="0" g="0" b="0"/>
-      </a:fillRef>
-      <a:effectRef idx="0">
-        <a:scrgbClr r="0" g="0" b="0"/>
-      </a:effectRef>
-      <a:fontRef idx="minor">
-        <a:schemeClr val="lt1"/>
-      </a:fontRef>
-    </dgm:style>
-  </dgm:styleLbl>
-  <dgm:styleLbl name="sibTrans1D1">
-    <dgm:scene3d>
-      <a:camera prst="orthographicFront"/>
-      <a:lightRig rig="threePt" dir="t"/>
-    </dgm:scene3d>
-    <dgm:sp3d/>
-    <dgm:txPr/>
-    <dgm:style>
-      <a:lnRef idx="1">
-        <a:scrgbClr r="0" g="0" b="0"/>
-      </a:lnRef>
-      <a:fillRef idx="0">
-        <a:scrgbClr r="0" g="0" b="0"/>
-      </a:fillRef>
-      <a:effectRef idx="0">
-        <a:scrgbClr r="0" g="0" b="0"/>
-      </a:effectRef>
-      <a:fontRef idx="minor"/>
-    </dgm:style>
-  </dgm:styleLbl>
-  <dgm:styleLbl name="callout">
-    <dgm:scene3d>
-      <a:camera prst="orthographicFront"/>
-      <a:lightRig rig="threePt" dir="t"/>
-    </dgm:scene3d>
-    <dgm:sp3d/>
-    <dgm:txPr/>
-    <dgm:style>
-      <a:lnRef idx="2">
-        <a:scrgbClr r="0" g="0" b="0"/>
-      </a:lnRef>
-      <a:fillRef idx="1">
-        <a:scrgbClr r="0" g="0" b="0"/>
-      </a:fillRef>
-      <a:effectRef idx="0">
-        <a:scrgbClr r="0" g="0" b="0"/>
-      </a:effectRef>
-      <a:fontRef idx="minor"/>
-    </dgm:style>
-  </dgm:styleLbl>
-  <dgm:styleLbl name="asst0">
-    <dgm:scene3d>
-      <a:camera prst="orthographicFront"/>
-      <a:lightRig rig="threePt" dir="t"/>
-    </dgm:scene3d>
-    <dgm:sp3d/>
-    <dgm:txPr/>
-    <dgm:style>
-      <a:lnRef idx="2">
-        <a:scrgbClr r="0" g="0" b="0"/>
-      </a:lnRef>
-      <a:fillRef idx="1">
-        <a:scrgbClr r="0" g="0" b="0"/>
-      </a:fillRef>
-      <a:effectRef idx="0">
-        <a:scrgbClr r="0" g="0" b="0"/>
-      </a:effectRef>
-      <a:fontRef idx="minor">
-        <a:schemeClr val="lt1"/>
-      </a:fontRef>
-    </dgm:style>
-  </dgm:styleLbl>
-  <dgm:styleLbl name="asst1">
-    <dgm:scene3d>
-      <a:camera prst="orthographicFront"/>
-      <a:lightRig rig="threePt" dir="t"/>
-    </dgm:scene3d>
-    <dgm:sp3d/>
-    <dgm:txPr/>
-    <dgm:style>
-      <a:lnRef idx="2">
-        <a:scrgbClr r="0" g="0" b="0"/>
-      </a:lnRef>
-      <a:fillRef idx="1">
-        <a:scrgbClr r="0" g="0" b="0"/>
-      </a:fillRef>
-      <a:effectRef idx="0">
-        <a:scrgbClr r="0" g="0" b="0"/>
-      </a:effectRef>
-      <a:fontRef idx="minor">
-        <a:schemeClr val="lt1"/>
-      </a:fontRef>
-    </dgm:style>
-  </dgm:styleLbl>
-  <dgm:styleLbl name="asst2">
-    <dgm:scene3d>
-      <a:camera prst="orthographicFront"/>
-      <a:lightRig rig="threePt" dir="t"/>
-    </dgm:scene3d>
-    <dgm:sp3d/>
-    <dgm:txPr/>
-    <dgm:style>
-      <a:lnRef idx="2">
-        <a:scrgbClr r="0" g="0" b="0"/>
-      </a:lnRef>
-      <a:fillRef idx="1">
-        <a:scrgbClr r="0" g="0" b="0"/>
-      </a:fillRef>
-      <a:effectRef idx="0">
-        <a:scrgbClr r="0" g="0" b="0"/>
-      </a:effectRef>
-      <a:fontRef idx="minor">
-        <a:schemeClr val="lt1"/>
-      </a:fontRef>
-    </dgm:style>
-  </dgm:styleLbl>
-  <dgm:styleLbl name="asst3">
-    <dgm:scene3d>
-      <a:camera prst="orthographicFront"/>
-      <a:lightRig rig="threePt" dir="t"/>
-    </dgm:scene3d>
-    <dgm:sp3d/>
-    <dgm:txPr/>
-    <dgm:style>
-      <a:lnRef idx="2">
-        <a:scrgbClr r="0" g="0" b="0"/>
-      </a:lnRef>
-      <a:fillRef idx="1">
-        <a:scrgbClr r="0" g="0" b="0"/>
-      </a:fillRef>
-      <a:effectRef idx="0">
-        <a:scrgbClr r="0" g="0" b="0"/>
-      </a:effectRef>
-      <a:fontRef idx="minor">
-        <a:schemeClr val="lt1"/>
-      </a:fontRef>
-    </dgm:style>
-  </dgm:styleLbl>
-  <dgm:styleLbl name="asst4">
-    <dgm:scene3d>
-      <a:camera prst="orthographicFront"/>
-      <a:lightRig rig="threePt" dir="t"/>
-    </dgm:scene3d>
-    <dgm:sp3d/>
-    <dgm:txPr/>
-    <dgm:style>
-      <a:lnRef idx="2">
-        <a:scrgbClr r="0" g="0" b="0"/>
-      </a:lnRef>
-      <a:fillRef idx="1">
-        <a:scrgbClr r="0" g="0" b="0"/>
-      </a:fillRef>
-      <a:effectRef idx="0">
-        <a:scrgbClr r="0" g="0" b="0"/>
-      </a:effectRef>
-      <a:fontRef idx="minor">
-        <a:schemeClr val="lt1"/>
-      </a:fontRef>
-    </dgm:style>
-  </dgm:styleLbl>
-  <dgm:styleLbl name="parChTrans2D1">
-    <dgm:scene3d>
-      <a:camera prst="orthographicFront"/>
-      <a:lightRig rig="threePt" dir="t"/>
-    </dgm:scene3d>
-    <dgm:sp3d/>
-    <dgm:txPr/>
-    <dgm:style>
-      <a:lnRef idx="2">
-        <a:scrgbClr r="0" g="0" b="0"/>
-      </a:lnRef>
-      <a:fillRef idx="1">
-        <a:scrgbClr r="0" g="0" b="0"/>
-      </a:fillRef>
-      <a:effectRef idx="0">
-        <a:scrgbClr r="0" g="0" b="0"/>
-      </a:effectRef>
-      <a:fontRef idx="minor">
-        <a:schemeClr val="lt1"/>
-      </a:fontRef>
-    </dgm:style>
-  </dgm:styleLbl>
-  <dgm:styleLbl name="parChTrans2D2">
-    <dgm:scene3d>
-      <a:camera prst="orthographicFront"/>
-      <a:lightRig rig="threePt" dir="t"/>
-    </dgm:scene3d>
-    <dgm:sp3d/>
-    <dgm:txPr/>
-    <dgm:style>
-      <a:lnRef idx="2">
-        <a:scrgbClr r="0" g="0" b="0"/>
-      </a:lnRef>
-      <a:fillRef idx="1">
-        <a:scrgbClr r="0" g="0" b="0"/>
-      </a:fillRef>
-      <a:effectRef idx="0">
-        <a:scrgbClr r="0" g="0" b="0"/>
-      </a:effectRef>
-      <a:fontRef idx="minor">
-        <a:schemeClr val="lt1"/>
-      </a:fontRef>
-    </dgm:style>
-  </dgm:styleLbl>
-  <dgm:styleLbl name="parChTrans2D3">
-    <dgm:scene3d>
-      <a:camera prst="orthographicFront"/>
-      <a:lightRig rig="threePt" dir="t"/>
-    </dgm:scene3d>
-    <dgm:sp3d/>
-    <dgm:txPr/>
-    <dgm:style>
-      <a:lnRef idx="2">
-        <a:scrgbClr r="0" g="0" b="0"/>
-      </a:lnRef>
-      <a:fillRef idx="1">
-        <a:scrgbClr r="0" g="0" b="0"/>
-      </a:fillRef>
-      <a:effectRef idx="0">
-        <a:scrgbClr r="0" g="0" b="0"/>
-      </a:effectRef>
-      <a:fontRef idx="minor">
-        <a:schemeClr val="lt1"/>
-      </a:fontRef>
-    </dgm:style>
-  </dgm:styleLbl>
-  <dgm:styleLbl name="parChTrans2D4">
-    <dgm:scene3d>
-      <a:camera prst="orthographicFront"/>
-      <a:lightRig rig="threePt" dir="t"/>
-    </dgm:scene3d>
-    <dgm:sp3d/>
-    <dgm:txPr/>
-    <dgm:style>
-      <a:lnRef idx="2">
-        <a:scrgbClr r="0" g="0" b="0"/>
-      </a:lnRef>
-      <a:fillRef idx="1">
-        <a:scrgbClr r="0" g="0" b="0"/>
-      </a:fillRef>
-      <a:effectRef idx="0">
-        <a:scrgbClr r="0" g="0" b="0"/>
-      </a:effectRef>
-      <a:fontRef idx="minor">
-        <a:schemeClr val="lt1"/>
-      </a:fontRef>
-    </dgm:style>
-  </dgm:styleLbl>
-  <dgm:styleLbl name="parChTrans1D1">
-    <dgm:scene3d>
-      <a:camera prst="orthographicFront"/>
-      <a:lightRig rig="threePt" dir="t"/>
-    </dgm:scene3d>
-    <dgm:sp3d/>
-    <dgm:txPr/>
-    <dgm:style>
-      <a:lnRef idx="2">
-        <a:scrgbClr r="0" g="0" b="0"/>
-      </a:lnRef>
-      <a:fillRef idx="0">
-        <a:scrgbClr r="0" g="0" b="0"/>
-      </a:fillRef>
-      <a:effectRef idx="0">
-        <a:scrgbClr r="0" g="0" b="0"/>
-      </a:effectRef>
-      <a:fontRef idx="minor"/>
-    </dgm:style>
-  </dgm:styleLbl>
-  <dgm:styleLbl name="parChTrans1D2">
-    <dgm:scene3d>
-      <a:camera prst="orthographicFront"/>
-      <a:lightRig rig="threePt" dir="t"/>
-    </dgm:scene3d>
-    <dgm:sp3d/>
-    <dgm:txPr/>
-    <dgm:style>
-      <a:lnRef idx="2">
-        <a:scrgbClr r="0" g="0" b="0"/>
-      </a:lnRef>
-      <a:fillRef idx="0">
-        <a:scrgbClr r="0" g="0" b="0"/>
-      </a:fillRef>
-      <a:effectRef idx="0">
-        <a:scrgbClr r="0" g="0" b="0"/>
-      </a:effectRef>
-      <a:fontRef idx="minor"/>
-    </dgm:style>
-  </dgm:styleLbl>
-  <dgm:styleLbl name="parChTrans1D3">
-    <dgm:scene3d>
-      <a:camera prst="orthographicFront"/>
-      <a:lightRig rig="threePt" dir="t"/>
-    </dgm:scene3d>
-    <dgm:sp3d/>
-    <dgm:txPr/>
-    <dgm:style>
-      <a:lnRef idx="2">
-        <a:scrgbClr r="0" g="0" b="0"/>
-      </a:lnRef>
-      <a:fillRef idx="0">
-        <a:scrgbClr r="0" g="0" b="0"/>
-      </a:fillRef>
-      <a:effectRef idx="0">
-        <a:scrgbClr r="0" g="0" b="0"/>
-      </a:effectRef>
-      <a:fontRef idx="minor"/>
-    </dgm:style>
-  </dgm:styleLbl>
-  <dgm:styleLbl name="parChTrans1D4">
-    <dgm:scene3d>
-      <a:camera prst="orthographicFront"/>
-      <a:lightRig rig="threePt" dir="t"/>
-    </dgm:scene3d>
-    <dgm:sp3d/>
-    <dgm:txPr/>
-    <dgm:style>
-      <a:lnRef idx="2">
-        <a:scrgbClr r="0" g="0" b="0"/>
-      </a:lnRef>
-      <a:fillRef idx="0">
-        <a:scrgbClr r="0" g="0" b="0"/>
-      </a:fillRef>
-      <a:effectRef idx="0">
-        <a:scrgbClr r="0" g="0" b="0"/>
-      </a:effectRef>
-      <a:fontRef idx="minor"/>
-    </dgm:style>
-  </dgm:styleLbl>
-  <dgm:styleLbl name="fgAcc1">
-    <dgm:scene3d>
-      <a:camera prst="orthographicFront"/>
-      <a:lightRig rig="threePt" dir="t"/>
-    </dgm:scene3d>
-    <dgm:sp3d/>
-    <dgm:txPr/>
-    <dgm:style>
-      <a:lnRef idx="2">
-        <a:scrgbClr r="0" g="0" b="0"/>
-      </a:lnRef>
-      <a:fillRef idx="1">
-        <a:scrgbClr r="0" g="0" b="0"/>
-      </a:fillRef>
-      <a:effectRef idx="0">
-        <a:scrgbClr r="0" g="0" b="0"/>
-      </a:effectRef>
-      <a:fontRef idx="minor"/>
-    </dgm:style>
-  </dgm:styleLbl>
-  <dgm:styleLbl name="conFgAcc1">
-    <dgm:scene3d>
-      <a:camera prst="orthographicFront"/>
-      <a:lightRig rig="threePt" dir="t"/>
-    </dgm:scene3d>
-    <dgm:sp3d/>
-    <dgm:txPr/>
-    <dgm:style>
-      <a:lnRef idx="2">
-        <a:scrgbClr r="0" g="0" b="0"/>
-      </a:lnRef>
-      <a:fillRef idx="1">
-        <a:scrgbClr r="0" g="0" b="0"/>
-      </a:fillRef>
-      <a:effectRef idx="0">
-        <a:scrgbClr r="0" g="0" b="0"/>
-      </a:effectRef>
-      <a:fontRef idx="minor"/>
-    </dgm:style>
-  </dgm:styleLbl>
-  <dgm:styleLbl name="alignAcc1">
-    <dgm:scene3d>
-      <a:camera prst="orthographicFront"/>
-      <a:lightRig rig="threePt" dir="t"/>
-    </dgm:scene3d>
-    <dgm:sp3d/>
-    <dgm:txPr/>
-    <dgm:style>
-      <a:lnRef idx="2">
-        <a:scrgbClr r="0" g="0" b="0"/>
-      </a:lnRef>
-      <a:fillRef idx="1">
-        <a:scrgbClr r="0" g="0" b="0"/>
-      </a:fillRef>
-      <a:effectRef idx="0">
-        <a:scrgbClr r="0" g="0" b="0"/>
-      </a:effectRef>
-      <a:fontRef idx="minor"/>
-    </dgm:style>
-  </dgm:styleLbl>
-  <dgm:styleLbl name="trAlignAcc1">
-    <dgm:scene3d>
-      <a:camera prst="orthographicFront"/>
-      <a:lightRig rig="threePt" dir="t"/>
-    </dgm:scene3d>
-    <dgm:sp3d/>
-    <dgm:txPr/>
-    <dgm:style>
-      <a:lnRef idx="1">
-        <a:scrgbClr r="0" g="0" b="0"/>
-      </a:lnRef>
-      <a:fillRef idx="1">
-        <a:scrgbClr r="0" g="0" b="0"/>
-      </a:fillRef>
-      <a:effectRef idx="0">
-        <a:scrgbClr r="0" g="0" b="0"/>
-      </a:effectRef>
-      <a:fontRef idx="minor"/>
-    </dgm:style>
-  </dgm:styleLbl>
-  <dgm:styleLbl name="bgAcc1">
-    <dgm:scene3d>
-      <a:camera prst="orthographicFront"/>
-      <a:lightRig rig="threePt" dir="t"/>
-    </dgm:scene3d>
-    <dgm:sp3d/>
-    <dgm:txPr/>
-    <dgm:style>
-      <a:lnRef idx="2">
-        <a:scrgbClr r="0" g="0" b="0"/>
-      </a:lnRef>
-      <a:fillRef idx="1">
-        <a:scrgbClr r="0" g="0" b="0"/>
-      </a:fillRef>
-      <a:effectRef idx="0">
-        <a:scrgbClr r="0" g="0" b="0"/>
-      </a:effectRef>
-      <a:fontRef idx="minor"/>
-    </dgm:style>
-  </dgm:styleLbl>
-  <dgm:styleLbl name="solidFgAcc1">
-    <dgm:scene3d>
-      <a:camera prst="orthographicFront"/>
-      <a:lightRig rig="threePt" dir="t"/>
-    </dgm:scene3d>
-    <dgm:sp3d/>
-    <dgm:txPr/>
-    <dgm:style>
-      <a:lnRef idx="2">
-        <a:scrgbClr r="0" g="0" b="0"/>
-      </a:lnRef>
-      <a:fillRef idx="1">
-        <a:scrgbClr r="0" g="0" b="0"/>
-      </a:fillRef>
-      <a:effectRef idx="0">
-        <a:scrgbClr r="0" g="0" b="0"/>
-      </a:effectRef>
-      <a:fontRef idx="minor"/>
-    </dgm:style>
-  </dgm:styleLbl>
-  <dgm:styleLbl name="solidAlignAcc1">
-    <dgm:scene3d>
-      <a:camera prst="orthographicFront"/>
-      <a:lightRig rig="threePt" dir="t"/>
-    </dgm:scene3d>
-    <dgm:sp3d/>
-    <dgm:txPr/>
-    <dgm:style>
-      <a:lnRef idx="2">
-        <a:scrgbClr r="0" g="0" b="0"/>
-      </a:lnRef>
-      <a:fillRef idx="1">
-        <a:scrgbClr r="0" g="0" b="0"/>
-      </a:fillRef>
-      <a:effectRef idx="0">
-        <a:scrgbClr r="0" g="0" b="0"/>
-      </a:effectRef>
-      <a:fontRef idx="minor"/>
-    </dgm:style>
-  </dgm:styleLbl>
-  <dgm:styleLbl name="solidBgAcc1">
-    <dgm:scene3d>
-      <a:camera prst="orthographicFront"/>
-      <a:lightRig rig="threePt" dir="t"/>
-    </dgm:scene3d>
-    <dgm:sp3d/>
-    <dgm:txPr/>
-    <dgm:style>
-      <a:lnRef idx="2">
-        <a:scrgbClr r="0" g="0" b="0"/>
-      </a:lnRef>
-      <a:fillRef idx="1">
-        <a:scrgbClr r="0" g="0" b="0"/>
-      </a:fillRef>
-      <a:effectRef idx="0">
-        <a:scrgbClr r="0" g="0" b="0"/>
-      </a:effectRef>
-      <a:fontRef idx="minor"/>
-    </dgm:style>
-  </dgm:styleLbl>
-  <dgm:styleLbl name="fgAccFollowNode1">
-    <dgm:scene3d>
-      <a:camera prst="orthographicFront"/>
-      <a:lightRig rig="threePt" dir="t"/>
-    </dgm:scene3d>
-    <dgm:sp3d/>
-    <dgm:txPr/>
-    <dgm:style>
-      <a:lnRef idx="2">
-        <a:scrgbClr r="0" g="0" b="0"/>
-      </a:lnRef>
-      <a:fillRef idx="1">
-        <a:scrgbClr r="0" g="0" b="0"/>
-      </a:fillRef>
-      <a:effectRef idx="0">
-        <a:scrgbClr r="0" g="0" b="0"/>
-      </a:effectRef>
-      <a:fontRef idx="minor"/>
-    </dgm:style>
-  </dgm:styleLbl>
-  <dgm:styleLbl name="alignAccFollowNode1">
-    <dgm:scene3d>
-      <a:camera prst="orthographicFront"/>
-      <a:lightRig rig="threePt" dir="t"/>
-    </dgm:scene3d>
-    <dgm:sp3d/>
-    <dgm:txPr/>
-    <dgm:style>
-      <a:lnRef idx="2">
-        <a:scrgbClr r="0" g="0" b="0"/>
-      </a:lnRef>
-      <a:fillRef idx="1">
-        <a:scrgbClr r="0" g="0" b="0"/>
-      </a:fillRef>
-      <a:effectRef idx="0">
-        <a:scrgbClr r="0" g="0" b="0"/>
-      </a:effectRef>
-      <a:fontRef idx="minor"/>
-    </dgm:style>
-  </dgm:styleLbl>
-  <dgm:styleLbl name="bgAccFollowNode1">
-    <dgm:scene3d>
-      <a:camera prst="orthographicFront"/>
-      <a:lightRig rig="threePt" dir="t"/>
-    </dgm:scene3d>
-    <dgm:sp3d/>
-    <dgm:txPr/>
-    <dgm:style>
-      <a:lnRef idx="2">
-        <a:scrgbClr r="0" g="0" b="0"/>
-      </a:lnRef>
-      <a:fillRef idx="1">
-        <a:scrgbClr r="0" g="0" b="0"/>
-      </a:fillRef>
-      <a:effectRef idx="0">
-        <a:scrgbClr r="0" g="0" b="0"/>
-      </a:effectRef>
-      <a:fontRef idx="minor"/>
-    </dgm:style>
-  </dgm:styleLbl>
-  <dgm:styleLbl name="fgAcc0">
-    <dgm:scene3d>
-      <a:camera prst="orthographicFront"/>
-      <a:lightRig rig="threePt" dir="t"/>
-    </dgm:scene3d>
-    <dgm:sp3d/>
-    <dgm:txPr/>
-    <dgm:style>
-      <a:lnRef idx="2">
-        <a:scrgbClr r="0" g="0" b="0"/>
-      </a:lnRef>
-      <a:fillRef idx="1">
-        <a:scrgbClr r="0" g="0" b="0"/>
-      </a:fillRef>
-      <a:effectRef idx="0">
-        <a:scrgbClr r="0" g="0" b="0"/>
-      </a:effectRef>
-      <a:fontRef idx="minor"/>
-    </dgm:style>
-  </dgm:styleLbl>
-  <dgm:styleLbl name="fgAcc2">
-    <dgm:scene3d>
-      <a:camera prst="orthographicFront"/>
-      <a:lightRig rig="threePt" dir="t"/>
-    </dgm:scene3d>
-    <dgm:sp3d/>
-    <dgm:txPr/>
-    <dgm:style>
-      <a:lnRef idx="2">
-        <a:scrgbClr r="0" g="0" b="0"/>
-      </a:lnRef>
-      <a:fillRef idx="1">
-        <a:scrgbClr r="0" g="0" b="0"/>
-      </a:fillRef>
-      <a:effectRef idx="0">
-        <a:scrgbClr r="0" g="0" b="0"/>
-      </a:effectRef>
-      <a:fontRef idx="minor"/>
-    </dgm:style>
-  </dgm:styleLbl>
-  <dgm:styleLbl name="fgAcc3">
-    <dgm:scene3d>
-      <a:camera prst="orthographicFront"/>
-      <a:lightRig rig="threePt" dir="t"/>
-    </dgm:scene3d>
-    <dgm:sp3d/>
-    <dgm:txPr/>
-    <dgm:style>
-      <a:lnRef idx="2">
-        <a:scrgbClr r="0" g="0" b="0"/>
-      </a:lnRef>
-      <a:fillRef idx="1">
-        <a:scrgbClr r="0" g="0" b="0"/>
-      </a:fillRef>
-      <a:effectRef idx="0">
-        <a:scrgbClr r="0" g="0" b="0"/>
-      </a:effectRef>
-      <a:fontRef idx="minor"/>
-    </dgm:style>
-  </dgm:styleLbl>
-  <dgm:styleLbl name="fgAcc4">
-    <dgm:scene3d>
-      <a:camera prst="orthographicFront"/>
-      <a:lightRig rig="threePt" dir="t"/>
-    </dgm:scene3d>
-    <dgm:sp3d/>
-    <dgm:txPr/>
-    <dgm:style>
-      <a:lnRef idx="2">
-        <a:scrgbClr r="0" g="0" b="0"/>
-      </a:lnRef>
-      <a:fillRef idx="1">
-        <a:scrgbClr r="0" g="0" b="0"/>
-      </a:fillRef>
-      <a:effectRef idx="0">
-        <a:scrgbClr r="0" g="0" b="0"/>
-      </a:effectRef>
-      <a:fontRef idx="minor"/>
-    </dgm:style>
-  </dgm:styleLbl>
-  <dgm:styleLbl name="bgShp">
-    <dgm:scene3d>
-      <a:camera prst="orthographicFront"/>
-      <a:lightRig rig="threePt" dir="t"/>
-    </dgm:scene3d>
-    <dgm:sp3d/>
-    <dgm:txPr/>
-    <dgm:style>
-      <a:lnRef idx="0">
-        <a:scrgbClr r="0" g="0" b="0"/>
-      </a:lnRef>
-      <a:fillRef idx="1">
-        <a:scrgbClr r="0" g="0" b="0"/>
-      </a:fillRef>
-      <a:effectRef idx="0">
-        <a:scrgbClr r="0" g="0" b="0"/>
-      </a:effectRef>
-      <a:fontRef idx="minor"/>
-    </dgm:style>
-  </dgm:styleLbl>
-  <dgm:styleLbl name="dkBgShp">
-    <dgm:scene3d>
-      <a:camera prst="orthographicFront"/>
-      <a:lightRig rig="threePt" dir="t"/>
-    </dgm:scene3d>
-    <dgm:sp3d/>
-    <dgm:txPr/>
-    <dgm:style>
-      <a:lnRef idx="0">
-        <a:scrgbClr r="0" g="0" b="0"/>
-      </a:lnRef>
-      <a:fillRef idx="1">
-        <a:scrgbClr r="0" g="0" b="0"/>
-      </a:fillRef>
-      <a:effectRef idx="0">
-        <a:scrgbClr r="0" g="0" b="0"/>
-      </a:effectRef>
-      <a:fontRef idx="minor"/>
-    </dgm:style>
-  </dgm:styleLbl>
-  <dgm:styleLbl name="trBgShp">
-    <dgm:scene3d>
-      <a:camera prst="orthographicFront"/>
-      <a:lightRig rig="threePt" dir="t"/>
-    </dgm:scene3d>
-    <dgm:sp3d/>
-    <dgm:txPr/>
-    <dgm:style>
-      <a:lnRef idx="0">
-        <a:scrgbClr r="0" g="0" b="0"/>
-      </a:lnRef>
-      <a:fillRef idx="1">
-        <a:scrgbClr r="0" g="0" b="0"/>
-      </a:fillRef>
-      <a:effectRef idx="0">
-        <a:scrgbClr r="0" g="0" b="0"/>
-      </a:effectRef>
-      <a:fontRef idx="minor"/>
-    </dgm:style>
-  </dgm:styleLbl>
-  <dgm:styleLbl name="fgShp">
-    <dgm:scene3d>
-      <a:camera prst="orthographicFront"/>
-      <a:lightRig rig="threePt" dir="t"/>
-    </dgm:scene3d>
-    <dgm:sp3d/>
-    <dgm:txPr/>
-    <dgm:style>
-      <a:lnRef idx="2">
-        <a:scrgbClr r="0" g="0" b="0"/>
-      </a:lnRef>
-      <a:fillRef idx="1">
-        <a:scrgbClr r="0" g="0" b="0"/>
-      </a:fillRef>
-      <a:effectRef idx="0">
-        <a:scrgbClr r="0" g="0" b="0"/>
-      </a:effectRef>
-      <a:fontRef idx="minor"/>
-    </dgm:style>
-  </dgm:styleLbl>
-  <dgm:styleLbl name="revTx">
-    <dgm:scene3d>
-      <a:camera prst="orthographicFront"/>
-      <a:lightRig rig="threePt" dir="t"/>
-    </dgm:scene3d>
-    <dgm:sp3d/>
-    <dgm:txPr/>
-    <dgm:style>
-      <a:lnRef idx="0">
-        <a:scrgbClr r="0" g="0" b="0"/>
-      </a:lnRef>
-      <a:fillRef idx="0">
-        <a:scrgbClr r="0" g="0" b="0"/>
-      </a:fillRef>
-      <a:effectRef idx="0">
-        <a:scrgbClr r="0" g="0" b="0"/>
-      </a:effectRef>
-      <a:fontRef idx="minor"/>
-    </dgm:style>
-  </dgm:styleLbl>
-</dgm:styleDef>
-</file>
-
 <file path=ppt/slideLayouts/slideLayout1.xml><?xml version="1.0" encoding="utf-8"?>
 <p:sldLayout xmlns:a="http://schemas.openxmlformats.org/drawingml/2006/main" xmlns:r="http://schemas.openxmlformats.org/officeDocument/2006/relationships" xmlns:p="http://schemas.openxmlformats.org/presentationml/2006/main" type="title" preserve="1">
   <p:cSld name="Title Slide">
@@ -3404,7 +251,7 @@
           <a:p>
             <a:fld id="{FDF6CFBC-3716-42EF-B5F5-D91E21C7F8E5}" type="datetimeFigureOut">
               <a:rPr lang="en-US" smtClean="0"/>
-              <a:t>13-Jul-17</a:t>
+              <a:t>19-Jul-17</a:t>
             </a:fld>
             <a:endParaRPr lang="en-US"/>
           </a:p>
@@ -3574,7 +421,7 @@
           <a:p>
             <a:fld id="{FDF6CFBC-3716-42EF-B5F5-D91E21C7F8E5}" type="datetimeFigureOut">
               <a:rPr lang="en-US" smtClean="0"/>
-              <a:t>13-Jul-17</a:t>
+              <a:t>19-Jul-17</a:t>
             </a:fld>
             <a:endParaRPr lang="en-US"/>
           </a:p>
@@ -3754,7 +601,7 @@
           <a:p>
             <a:fld id="{FDF6CFBC-3716-42EF-B5F5-D91E21C7F8E5}" type="datetimeFigureOut">
               <a:rPr lang="en-US" smtClean="0"/>
-              <a:t>13-Jul-17</a:t>
+              <a:t>19-Jul-17</a:t>
             </a:fld>
             <a:endParaRPr lang="en-US"/>
           </a:p>
@@ -3924,7 +771,7 @@
           <a:p>
             <a:fld id="{FDF6CFBC-3716-42EF-B5F5-D91E21C7F8E5}" type="datetimeFigureOut">
               <a:rPr lang="en-US" smtClean="0"/>
-              <a:t>13-Jul-17</a:t>
+              <a:t>19-Jul-17</a:t>
             </a:fld>
             <a:endParaRPr lang="en-US"/>
           </a:p>
@@ -4170,7 +1017,7 @@
           <a:p>
             <a:fld id="{FDF6CFBC-3716-42EF-B5F5-D91E21C7F8E5}" type="datetimeFigureOut">
               <a:rPr lang="en-US" smtClean="0"/>
-              <a:t>13-Jul-17</a:t>
+              <a:t>19-Jul-17</a:t>
             </a:fld>
             <a:endParaRPr lang="en-US"/>
           </a:p>
@@ -4402,7 +1249,7 @@
           <a:p>
             <a:fld id="{FDF6CFBC-3716-42EF-B5F5-D91E21C7F8E5}" type="datetimeFigureOut">
               <a:rPr lang="en-US" smtClean="0"/>
-              <a:t>13-Jul-17</a:t>
+              <a:t>19-Jul-17</a:t>
             </a:fld>
             <a:endParaRPr lang="en-US"/>
           </a:p>
@@ -4769,7 +1616,7 @@
           <a:p>
             <a:fld id="{FDF6CFBC-3716-42EF-B5F5-D91E21C7F8E5}" type="datetimeFigureOut">
               <a:rPr lang="en-US" smtClean="0"/>
-              <a:t>13-Jul-17</a:t>
+              <a:t>19-Jul-17</a:t>
             </a:fld>
             <a:endParaRPr lang="en-US"/>
           </a:p>
@@ -4887,7 +1734,7 @@
           <a:p>
             <a:fld id="{FDF6CFBC-3716-42EF-B5F5-D91E21C7F8E5}" type="datetimeFigureOut">
               <a:rPr lang="en-US" smtClean="0"/>
-              <a:t>13-Jul-17</a:t>
+              <a:t>19-Jul-17</a:t>
             </a:fld>
             <a:endParaRPr lang="en-US"/>
           </a:p>
@@ -4982,7 +1829,7 @@
           <a:p>
             <a:fld id="{FDF6CFBC-3716-42EF-B5F5-D91E21C7F8E5}" type="datetimeFigureOut">
               <a:rPr lang="en-US" smtClean="0"/>
-              <a:t>13-Jul-17</a:t>
+              <a:t>19-Jul-17</a:t>
             </a:fld>
             <a:endParaRPr lang="en-US"/>
           </a:p>
@@ -5259,7 +2106,7 @@
           <a:p>
             <a:fld id="{FDF6CFBC-3716-42EF-B5F5-D91E21C7F8E5}" type="datetimeFigureOut">
               <a:rPr lang="en-US" smtClean="0"/>
-              <a:t>13-Jul-17</a:t>
+              <a:t>19-Jul-17</a:t>
             </a:fld>
             <a:endParaRPr lang="en-US"/>
           </a:p>
@@ -5516,7 +2363,7 @@
           <a:p>
             <a:fld id="{FDF6CFBC-3716-42EF-B5F5-D91E21C7F8E5}" type="datetimeFigureOut">
               <a:rPr lang="en-US" smtClean="0"/>
-              <a:t>13-Jul-17</a:t>
+              <a:t>19-Jul-17</a:t>
             </a:fld>
             <a:endParaRPr lang="en-US"/>
           </a:p>
@@ -5729,7 +2576,7 @@
           <a:p>
             <a:fld id="{FDF6CFBC-3716-42EF-B5F5-D91E21C7F8E5}" type="datetimeFigureOut">
               <a:rPr lang="en-US" smtClean="0"/>
-              <a:t>13-Jul-17</a:t>
+              <a:t>19-Jul-17</a:t>
             </a:fld>
             <a:endParaRPr lang="en-US"/>
           </a:p>
@@ -6120,6 +2967,14 @@
 <file path=ppt/slides/slide1.xml><?xml version="1.0" encoding="utf-8"?>
 <p:sld xmlns:a="http://schemas.openxmlformats.org/drawingml/2006/main" xmlns:r="http://schemas.openxmlformats.org/officeDocument/2006/relationships" xmlns:p="http://schemas.openxmlformats.org/presentationml/2006/main">
   <p:cSld>
+    <p:bg>
+      <p:bgPr>
+        <a:solidFill>
+          <a:schemeClr val="bg1"/>
+        </a:solidFill>
+        <a:effectLst/>
+      </p:bgPr>
+    </p:bg>
     <p:spTree>
       <p:nvGrpSpPr>
         <p:cNvPr id="1" name=""/>
@@ -6272,6 +3127,14 @@
 <file path=ppt/slides/slide2.xml><?xml version="1.0" encoding="utf-8"?>
 <p:sld xmlns:a="http://schemas.openxmlformats.org/drawingml/2006/main" xmlns:r="http://schemas.openxmlformats.org/officeDocument/2006/relationships" xmlns:p="http://schemas.openxmlformats.org/presentationml/2006/main">
   <p:cSld>
+    <p:bg>
+      <p:bgPr>
+        <a:solidFill>
+          <a:schemeClr val="bg1"/>
+        </a:solidFill>
+        <a:effectLst/>
+      </p:bgPr>
+    </p:bg>
     <p:spTree>
       <p:nvGrpSpPr>
         <p:cNvPr id="1" name=""/>
@@ -6922,6 +3785,14 @@
 <file path=ppt/slides/slide3.xml><?xml version="1.0" encoding="utf-8"?>
 <p:sld xmlns:a="http://schemas.openxmlformats.org/drawingml/2006/main" xmlns:r="http://schemas.openxmlformats.org/officeDocument/2006/relationships" xmlns:p="http://schemas.openxmlformats.org/presentationml/2006/main">
   <p:cSld>
+    <p:bg>
+      <p:bgPr>
+        <a:solidFill>
+          <a:schemeClr val="bg1"/>
+        </a:solidFill>
+        <a:effectLst/>
+      </p:bgPr>
+    </p:bg>
     <p:spTree>
       <p:nvGrpSpPr>
         <p:cNvPr id="1" name=""/>
@@ -6966,31 +3837,63 @@
           </a:p>
         </p:txBody>
       </p:sp>
-      <p:graphicFrame>
-        <p:nvGraphicFramePr>
-          <p:cNvPr id="5" name="Content Placeholder 2"/>
-          <p:cNvGraphicFramePr>
-            <a:graphicFrameLocks noGrp="1"/>
-          </p:cNvGraphicFramePr>
+      <p:sp>
+        <p:nvSpPr>
+          <p:cNvPr id="3" name="Content Placeholder 2">
+            <a:extLst>
+              <a:ext uri="{FF2B5EF4-FFF2-40B4-BE49-F238E27FC236}">
+                <a16:creationId xmlns:a16="http://schemas.microsoft.com/office/drawing/2014/main" id="{F9264B93-A9ED-4B0C-A4B5-652F137A5236}"/>
+              </a:ext>
+            </a:extLst>
+          </p:cNvPr>
+          <p:cNvSpPr>
+            <a:spLocks noGrp="1"/>
+          </p:cNvSpPr>
           <p:nvPr>
             <p:ph idx="1"/>
-            <p:extLst>
-              <p:ext uri="{D42A27DB-BD31-4B8C-83A1-F6EECF244321}">
-                <p14:modId xmlns:p14="http://schemas.microsoft.com/office/powerpoint/2010/main" val="2155755543"/>
-              </p:ext>
-            </p:extLst>
-          </p:nvPr>
-        </p:nvGraphicFramePr>
-        <p:xfrm>
-          <a:off x="838200" y="1825625"/>
-          <a:ext cx="10515600" cy="4351338"/>
-        </p:xfrm>
-        <a:graphic>
-          <a:graphicData uri="http://schemas.openxmlformats.org/drawingml/2006/diagram">
-            <dgm:relIds xmlns:dgm="http://schemas.openxmlformats.org/drawingml/2006/diagram" xmlns:r="http://schemas.openxmlformats.org/officeDocument/2006/relationships" r:dm="rId2" r:lo="rId3" r:qs="rId4" r:cs="rId5"/>
-          </a:graphicData>
-        </a:graphic>
-      </p:graphicFrame>
+          </p:nvPr>
+        </p:nvSpPr>
+        <p:spPr/>
+        <p:txBody>
+          <a:bodyPr/>
+          <a:lstStyle/>
+          <a:p>
+            <a:r>
+              <a:rPr lang="en-US" dirty="0"/>
+              <a:t>Download and open up the AT_Command_HC-06 INO file</a:t>
+            </a:r>
+          </a:p>
+          <a:p>
+            <a:pPr lvl="1"/>
+            <a:r>
+              <a:rPr lang="en-US" dirty="0"/>
+              <a:t>Link for AT Command INO File:</a:t>
+            </a:r>
+          </a:p>
+          <a:p>
+            <a:pPr lvl="1"/>
+            <a:r>
+              <a:rPr lang="en-US" dirty="0">
+                <a:hlinkClick r:id="rId2"/>
+              </a:rPr>
+              <a:t>https://github.com/ChuaKengPeng/DIP2017/tree/master/AT_Command_HC-06_Program</a:t>
+            </a:r>
+            <a:endParaRPr lang="en-US" dirty="0"/>
+          </a:p>
+          <a:p>
+            <a:r>
+              <a:rPr lang="en-US" dirty="0"/>
+              <a:t>Read the instructions written within /*       */ before uploading the program</a:t>
+            </a:r>
+          </a:p>
+          <a:p>
+            <a:r>
+              <a:rPr lang="en-US" dirty="0"/>
+              <a:t>Refer to the next two slides for more information on AT Commands</a:t>
+            </a:r>
+          </a:p>
+        </p:txBody>
+      </p:sp>
     </p:spTree>
     <p:extLst>
       <p:ext uri="{BB962C8B-B14F-4D97-AF65-F5344CB8AC3E}">
@@ -7007,6 +3910,14 @@
 <file path=ppt/slides/slide4.xml><?xml version="1.0" encoding="utf-8"?>
 <p:sld xmlns:a="http://schemas.openxmlformats.org/drawingml/2006/main" xmlns:r="http://schemas.openxmlformats.org/officeDocument/2006/relationships" xmlns:p="http://schemas.openxmlformats.org/presentationml/2006/main">
   <p:cSld>
+    <p:bg>
+      <p:bgPr>
+        <a:solidFill>
+          <a:schemeClr val="bg1"/>
+        </a:solidFill>
+        <a:effectLst/>
+      </p:bgPr>
+    </p:bg>
     <p:spTree>
       <p:nvGrpSpPr>
         <p:cNvPr id="1" name=""/>
@@ -7023,6 +3934,108 @@
       </p:grpSpPr>
       <p:sp>
         <p:nvSpPr>
+          <p:cNvPr id="8" name="Rectangle 7"/>
+          <p:cNvSpPr>
+            <a:spLocks noGrp="1" noRot="1" noChangeAspect="1" noMove="1" noResize="1" noEditPoints="1" noAdjustHandles="1" noChangeArrowheads="1" noChangeShapeType="1" noTextEdit="1"/>
+          </p:cNvSpPr>
+          <p:nvPr>
+            <p:extLst>
+              <p:ext uri="{386F3935-93C4-4BCD-93E2-E3B085C9AB24}">
+                <p16:designElem xmlns:p16="http://schemas.microsoft.com/office/powerpoint/2015/main" val="1"/>
+              </p:ext>
+            </p:extLst>
+          </p:nvPr>
+        </p:nvSpPr>
+        <p:spPr bwMode="ltGray">
+          <a:xfrm>
+            <a:off x="321564" y="320040"/>
+            <a:ext cx="11548872" cy="6217920"/>
+          </a:xfrm>
+          <a:prstGeom prst="rect">
+            <a:avLst/>
+          </a:prstGeom>
+          <a:solidFill>
+            <a:schemeClr val="tx1">
+              <a:alpha val="8000"/>
+            </a:schemeClr>
+          </a:solidFill>
+          <a:ln w="127000" cap="sq" cmpd="thinThick">
+            <a:noFill/>
+          </a:ln>
+        </p:spPr>
+        <p:style>
+          <a:lnRef idx="2">
+            <a:schemeClr val="accent1">
+              <a:shade val="50000"/>
+            </a:schemeClr>
+          </a:lnRef>
+          <a:fillRef idx="1">
+            <a:schemeClr val="accent1"/>
+          </a:fillRef>
+          <a:effectRef idx="0">
+            <a:schemeClr val="accent1"/>
+          </a:effectRef>
+          <a:fontRef idx="minor">
+            <a:schemeClr val="lt1"/>
+          </a:fontRef>
+        </p:style>
+        <p:txBody>
+          <a:bodyPr rtlCol="0" anchor="ctr"/>
+          <a:lstStyle/>
+          <a:p>
+            <a:pPr algn="ctr"/>
+            <a:endParaRPr lang="en-US"/>
+          </a:p>
+        </p:txBody>
+      </p:sp>
+      <p:cxnSp>
+        <p:nvCxnSpPr>
+          <p:cNvPr id="10" name="Straight Connector 9"/>
+          <p:cNvCxnSpPr>
+            <a:cxnSpLocks noGrp="1" noRot="1" noChangeAspect="1" noMove="1" noResize="1" noEditPoints="1" noAdjustHandles="1" noChangeArrowheads="1" noChangeShapeType="1"/>
+          </p:cNvCxnSpPr>
+          <p:nvPr>
+            <p:extLst>
+              <p:ext uri="{386F3935-93C4-4BCD-93E2-E3B085C9AB24}">
+                <p16:designElem xmlns:p16="http://schemas.microsoft.com/office/powerpoint/2015/main" val="1"/>
+              </p:ext>
+            </p:extLst>
+          </p:nvPr>
+        </p:nvCxnSpPr>
+        <p:spPr>
+          <a:xfrm>
+            <a:off x="4654296" y="2057400"/>
+            <a:ext cx="0" cy="2743200"/>
+          </a:xfrm>
+          <a:prstGeom prst="line">
+            <a:avLst/>
+          </a:prstGeom>
+          <a:ln w="19050">
+            <a:solidFill>
+              <a:schemeClr val="tx1">
+                <a:lumMod val="85000"/>
+                <a:lumOff val="15000"/>
+              </a:schemeClr>
+            </a:solidFill>
+          </a:ln>
+        </p:spPr>
+        <p:style>
+          <a:lnRef idx="1">
+            <a:schemeClr val="accent1"/>
+          </a:lnRef>
+          <a:fillRef idx="0">
+            <a:schemeClr val="accent1"/>
+          </a:fillRef>
+          <a:effectRef idx="0">
+            <a:schemeClr val="accent1"/>
+          </a:effectRef>
+          <a:fontRef idx="minor">
+            <a:schemeClr val="tx1"/>
+          </a:fontRef>
+        </p:style>
+      </p:cxnSp>
+      <p:sp>
+        <p:nvSpPr>
           <p:cNvPr id="2" name="Title 1">
             <a:extLst>
               <a:ext uri="{FF2B5EF4-FFF2-40B4-BE49-F238E27FC236}">
@@ -7037,16 +4050,27 @@
             <p:ph type="title"/>
           </p:nvPr>
         </p:nvSpPr>
-        <p:spPr/>
-        <p:txBody>
-          <a:bodyPr/>
-          <a:lstStyle/>
-          <a:p>
-            <a:r>
-              <a:rPr lang="en-US"/>
+        <p:spPr>
+          <a:xfrm>
+            <a:off x="838200" y="963877"/>
+            <a:ext cx="3494362" cy="4930246"/>
+          </a:xfrm>
+        </p:spPr>
+        <p:txBody>
+          <a:bodyPr>
+            <a:normAutofit/>
+          </a:bodyPr>
+          <a:lstStyle/>
+          <a:p>
+            <a:pPr algn="r"/>
+            <a:r>
+              <a:rPr lang="en-US">
+                <a:solidFill>
+                  <a:schemeClr val="accent1"/>
+                </a:solidFill>
+              </a:rPr>
               <a:t>AT Commands Instructions</a:t>
             </a:r>
-            <a:endParaRPr lang="en-US" dirty="0"/>
           </a:p>
         </p:txBody>
       </p:sp>
@@ -7068,13 +4092,13 @@
         </p:nvSpPr>
         <p:spPr>
           <a:xfrm>
-            <a:off x="838200" y="1825625"/>
-            <a:ext cx="6177951" cy="4351338"/>
+            <a:off x="4976031" y="963877"/>
+            <a:ext cx="6377769" cy="4930246"/>
           </a:xfrm>
         </p:spPr>
         <p:txBody>
-          <a:bodyPr>
-            <a:normAutofit lnSpcReduction="10000"/>
+          <a:bodyPr anchor="ctr">
+            <a:normAutofit/>
           </a:bodyPr>
           <a:lstStyle/>
           <a:p>
@@ -7082,23 +4106,23 @@
               <a:buNone/>
             </a:pPr>
             <a:r>
-              <a:rPr lang="en-SG" u="sng"/>
+              <a:rPr lang="en-SG" sz="2400" u="sng" dirty="0"/>
               <a:t>AT Commands Available:</a:t>
             </a:r>
           </a:p>
           <a:p>
             <a:r>
-              <a:rPr lang="en-SG"/>
+              <a:rPr lang="en-SG" sz="2400" dirty="0"/>
               <a:t>AT : check the connection</a:t>
             </a:r>
           </a:p>
           <a:p>
             <a:r>
-              <a:rPr lang="en-SG"/>
+              <a:rPr lang="en-SG" sz="2400" dirty="0"/>
               <a:t>AT+NAME: Change name. </a:t>
             </a:r>
             <a:r>
-              <a:rPr lang="en-SG">
+              <a:rPr lang="en-SG" sz="2400" dirty="0">
                 <a:solidFill>
                   <a:srgbClr val="FF0000"/>
                 </a:solidFill>
@@ -7108,11 +4132,11 @@
           </a:p>
           <a:p>
             <a:r>
-              <a:rPr lang="en-SG"/>
+              <a:rPr lang="en-SG" sz="2400" dirty="0"/>
               <a:t>AT+BAUD</a:t>
             </a:r>
             <a:r>
-              <a:rPr lang="en-SG">
+              <a:rPr lang="en-SG" sz="2400" dirty="0">
                 <a:solidFill>
                   <a:srgbClr val="FF0000"/>
                 </a:solidFill>
@@ -7120,23 +4144,23 @@
               <a:t>X</a:t>
             </a:r>
             <a:r>
-              <a:rPr lang="en-SG"/>
+              <a:rPr lang="en-SG" sz="2400" dirty="0"/>
               <a:t>: change baud rate, </a:t>
             </a:r>
             <a:r>
-              <a:rPr lang="en-SG">
+              <a:rPr lang="en-SG" sz="2400" dirty="0">
                 <a:solidFill>
                   <a:srgbClr val="FF0000"/>
                 </a:solidFill>
               </a:rPr>
-              <a:t>X</a:t>
-            </a:r>
-            <a:r>
-              <a:rPr lang="en-SG"/>
-              <a:t> is baud rate code, </a:t>
-            </a:r>
-            <a:r>
-              <a:rPr lang="en-SG">
+              <a:t>X </a:t>
+            </a:r>
+            <a:r>
+              <a:rPr lang="en-SG" sz="2400" dirty="0"/>
+              <a:t>is baud rate code, </a:t>
+            </a:r>
+            <a:r>
+              <a:rPr lang="en-SG" sz="2400" dirty="0">
                 <a:solidFill>
                   <a:srgbClr val="FF0000"/>
                 </a:solidFill>
@@ -7146,11 +4170,11 @@
           </a:p>
           <a:p>
             <a:r>
-              <a:rPr lang="en-SG"/>
+              <a:rPr lang="en-SG" sz="2400" dirty="0"/>
               <a:t>AT+PIN</a:t>
             </a:r>
             <a:r>
-              <a:rPr lang="en-SG">
+              <a:rPr lang="en-SG" sz="2400" dirty="0">
                 <a:solidFill>
                   <a:srgbClr val="FF0000"/>
                 </a:solidFill>
@@ -7158,11 +4182,11 @@
               <a:t>XXXX</a:t>
             </a:r>
             <a:r>
-              <a:rPr lang="en-SG"/>
+              <a:rPr lang="en-SG" sz="2400" dirty="0"/>
               <a:t>: change pin, </a:t>
             </a:r>
             <a:r>
-              <a:rPr lang="en-SG">
+              <a:rPr lang="en-SG" sz="2400" dirty="0">
                 <a:solidFill>
                   <a:srgbClr val="FF0000"/>
                 </a:solidFill>
@@ -7170,11 +4194,11 @@
               <a:t>XXXX</a:t>
             </a:r>
             <a:r>
-              <a:rPr lang="en-SG"/>
+              <a:rPr lang="en-SG" sz="2400" dirty="0"/>
               <a:t> is the pin, again, </a:t>
             </a:r>
             <a:r>
-              <a:rPr lang="en-SG">
+              <a:rPr lang="en-SG" sz="2400" dirty="0">
                 <a:solidFill>
                   <a:srgbClr val="FF0000"/>
                 </a:solidFill>
@@ -7184,10 +4208,10 @@
           </a:p>
           <a:p>
             <a:r>
-              <a:rPr lang="en-SG"/>
+              <a:rPr lang="en-SG" sz="2400" dirty="0"/>
               <a:t>AT+VERSION</a:t>
             </a:r>
-            <a:endParaRPr lang="en-US" dirty="0"/>
+            <a:endParaRPr lang="en-US" sz="2400" dirty="0"/>
           </a:p>
         </p:txBody>
       </p:sp>
@@ -7207,6 +4231,14 @@
 <file path=ppt/slides/slide5.xml><?xml version="1.0" encoding="utf-8"?>
 <p:sld xmlns:a="http://schemas.openxmlformats.org/drawingml/2006/main" xmlns:r="http://schemas.openxmlformats.org/officeDocument/2006/relationships" xmlns:p="http://schemas.openxmlformats.org/presentationml/2006/main">
   <p:cSld>
+    <p:bg>
+      <p:bgPr>
+        <a:solidFill>
+          <a:schemeClr val="bg1"/>
+        </a:solidFill>
+        <a:effectLst/>
+      </p:bgPr>
+    </p:bg>
     <p:spTree>
       <p:nvGrpSpPr>
         <p:cNvPr id="1" name=""/>
@@ -7223,6 +4255,108 @@
       </p:grpSpPr>
       <p:sp>
         <p:nvSpPr>
+          <p:cNvPr id="8" name="Rectangle 7"/>
+          <p:cNvSpPr>
+            <a:spLocks noGrp="1" noRot="1" noChangeAspect="1" noMove="1" noResize="1" noEditPoints="1" noAdjustHandles="1" noChangeArrowheads="1" noChangeShapeType="1" noTextEdit="1"/>
+          </p:cNvSpPr>
+          <p:nvPr>
+            <p:extLst>
+              <p:ext uri="{386F3935-93C4-4BCD-93E2-E3B085C9AB24}">
+                <p16:designElem xmlns:p16="http://schemas.microsoft.com/office/powerpoint/2015/main" val="1"/>
+              </p:ext>
+            </p:extLst>
+          </p:nvPr>
+        </p:nvSpPr>
+        <p:spPr bwMode="ltGray">
+          <a:xfrm>
+            <a:off x="321564" y="320040"/>
+            <a:ext cx="11548872" cy="6217920"/>
+          </a:xfrm>
+          <a:prstGeom prst="rect">
+            <a:avLst/>
+          </a:prstGeom>
+          <a:solidFill>
+            <a:schemeClr val="tx1">
+              <a:alpha val="8000"/>
+            </a:schemeClr>
+          </a:solidFill>
+          <a:ln w="127000" cap="sq" cmpd="thinThick">
+            <a:noFill/>
+          </a:ln>
+        </p:spPr>
+        <p:style>
+          <a:lnRef idx="2">
+            <a:schemeClr val="accent1">
+              <a:shade val="50000"/>
+            </a:schemeClr>
+          </a:lnRef>
+          <a:fillRef idx="1">
+            <a:schemeClr val="accent1"/>
+          </a:fillRef>
+          <a:effectRef idx="0">
+            <a:schemeClr val="accent1"/>
+          </a:effectRef>
+          <a:fontRef idx="minor">
+            <a:schemeClr val="lt1"/>
+          </a:fontRef>
+        </p:style>
+        <p:txBody>
+          <a:bodyPr rtlCol="0" anchor="ctr"/>
+          <a:lstStyle/>
+          <a:p>
+            <a:pPr algn="ctr"/>
+            <a:endParaRPr lang="en-US"/>
+          </a:p>
+        </p:txBody>
+      </p:sp>
+      <p:cxnSp>
+        <p:nvCxnSpPr>
+          <p:cNvPr id="10" name="Straight Connector 9"/>
+          <p:cNvCxnSpPr>
+            <a:cxnSpLocks noGrp="1" noRot="1" noChangeAspect="1" noMove="1" noResize="1" noEditPoints="1" noAdjustHandles="1" noChangeArrowheads="1" noChangeShapeType="1"/>
+          </p:cNvCxnSpPr>
+          <p:nvPr>
+            <p:extLst>
+              <p:ext uri="{386F3935-93C4-4BCD-93E2-E3B085C9AB24}">
+                <p16:designElem xmlns:p16="http://schemas.microsoft.com/office/powerpoint/2015/main" val="1"/>
+              </p:ext>
+            </p:extLst>
+          </p:nvPr>
+        </p:nvCxnSpPr>
+        <p:spPr>
+          <a:xfrm>
+            <a:off x="4654296" y="2057400"/>
+            <a:ext cx="0" cy="2743200"/>
+          </a:xfrm>
+          <a:prstGeom prst="line">
+            <a:avLst/>
+          </a:prstGeom>
+          <a:ln w="19050">
+            <a:solidFill>
+              <a:schemeClr val="tx1">
+                <a:lumMod val="85000"/>
+                <a:lumOff val="15000"/>
+              </a:schemeClr>
+            </a:solidFill>
+          </a:ln>
+        </p:spPr>
+        <p:style>
+          <a:lnRef idx="1">
+            <a:schemeClr val="accent1"/>
+          </a:lnRef>
+          <a:fillRef idx="0">
+            <a:schemeClr val="accent1"/>
+          </a:fillRef>
+          <a:effectRef idx="0">
+            <a:schemeClr val="accent1"/>
+          </a:effectRef>
+          <a:fontRef idx="minor">
+            <a:schemeClr val="tx1"/>
+          </a:fontRef>
+        </p:style>
+      </p:cxnSp>
+      <p:sp>
+        <p:nvSpPr>
           <p:cNvPr id="2" name="Title 1">
             <a:extLst>
               <a:ext uri="{FF2B5EF4-FFF2-40B4-BE49-F238E27FC236}">
@@ -7237,25 +4371,49 @@
             <p:ph type="title"/>
           </p:nvPr>
         </p:nvSpPr>
-        <p:spPr/>
-        <p:txBody>
-          <a:bodyPr/>
-          <a:lstStyle/>
-          <a:p>
-            <a:r>
-              <a:rPr lang="en-US" dirty="0" err="1"/>
+        <p:spPr>
+          <a:xfrm>
+            <a:off x="838200" y="963877"/>
+            <a:ext cx="3494362" cy="4930246"/>
+          </a:xfrm>
+        </p:spPr>
+        <p:txBody>
+          <a:bodyPr>
+            <a:normAutofit/>
+          </a:bodyPr>
+          <a:lstStyle/>
+          <a:p>
+            <a:pPr algn="r"/>
+            <a:r>
+              <a:rPr lang="en-US" dirty="0" err="1">
+                <a:solidFill>
+                  <a:schemeClr val="accent1"/>
+                </a:solidFill>
+              </a:rPr>
               <a:t>Baudrate</a:t>
             </a:r>
             <a:r>
-              <a:rPr lang="en-US" dirty="0"/>
+              <a:rPr lang="en-US" dirty="0">
+                <a:solidFill>
+                  <a:schemeClr val="accent1"/>
+                </a:solidFill>
+              </a:rPr>
               <a:t> </a:t>
             </a:r>
             <a:r>
-              <a:rPr lang="en-US" dirty="0" err="1"/>
+              <a:rPr lang="en-US" dirty="0" err="1">
+                <a:solidFill>
+                  <a:schemeClr val="accent1"/>
+                </a:solidFill>
+              </a:rPr>
               <a:t>Avaliable</a:t>
             </a:r>
             <a:r>
-              <a:rPr lang="en-US" dirty="0"/>
+              <a:rPr lang="en-US" dirty="0">
+                <a:solidFill>
+                  <a:schemeClr val="accent1"/>
+                </a:solidFill>
+              </a:rPr>
               <a:t>:</a:t>
             </a:r>
           </a:p>
@@ -7277,10 +4435,15 @@
             <p:ph idx="1"/>
           </p:nvPr>
         </p:nvSpPr>
-        <p:spPr/>
-        <p:txBody>
-          <a:bodyPr>
-            <a:normAutofit fontScale="92500" lnSpcReduction="20000"/>
+        <p:spPr>
+          <a:xfrm>
+            <a:off x="4976031" y="963877"/>
+            <a:ext cx="6377769" cy="4930246"/>
+          </a:xfrm>
+        </p:spPr>
+        <p:txBody>
+          <a:bodyPr anchor="ctr">
+            <a:normAutofit/>
           </a:bodyPr>
           <a:lstStyle/>
           <a:p>
@@ -7288,55 +4451,55 @@
               <a:buNone/>
             </a:pPr>
             <a:r>
-              <a:rPr lang="en-SG" dirty="0"/>
+              <a:rPr lang="en-SG" sz="2400" dirty="0"/>
               <a:t>To change baud rate, type AT+BAUDX, where X=1 to 9.</a:t>
             </a:r>
           </a:p>
           <a:p>
             <a:r>
-              <a:rPr lang="en-SG" dirty="0"/>
+              <a:rPr lang="en-SG" sz="2400" dirty="0"/>
               <a:t>1 set to 1200bps</a:t>
             </a:r>
           </a:p>
           <a:p>
             <a:r>
-              <a:rPr lang="en-SG" dirty="0"/>
+              <a:rPr lang="en-SG" sz="2400" dirty="0"/>
               <a:t>2 set to 2400bps </a:t>
             </a:r>
           </a:p>
           <a:p>
             <a:r>
-              <a:rPr lang="en-SG" dirty="0"/>
+              <a:rPr lang="en-SG" sz="2400" dirty="0"/>
               <a:t>3 set to 4800bps </a:t>
             </a:r>
           </a:p>
           <a:p>
             <a:r>
-              <a:rPr lang="en-SG" dirty="0"/>
+              <a:rPr lang="en-SG" sz="2400" dirty="0"/>
               <a:t>4 set to 9600bps (Default) </a:t>
             </a:r>
           </a:p>
           <a:p>
             <a:r>
-              <a:rPr lang="en-SG" dirty="0"/>
+              <a:rPr lang="en-SG" sz="2400" dirty="0"/>
               <a:t>5 set to 19200bps </a:t>
             </a:r>
           </a:p>
           <a:p>
             <a:r>
-              <a:rPr lang="en-SG" dirty="0"/>
+              <a:rPr lang="en-SG" sz="2400" dirty="0"/>
               <a:t>6 set to 38400bps </a:t>
             </a:r>
           </a:p>
           <a:p>
             <a:r>
-              <a:rPr lang="en-SG" dirty="0"/>
+              <a:rPr lang="en-SG" sz="2400" dirty="0"/>
               <a:t>7 set to 57600bps </a:t>
             </a:r>
           </a:p>
           <a:p>
             <a:r>
-              <a:rPr lang="en-SG" dirty="0">
+              <a:rPr lang="en-SG" sz="2400" dirty="0">
                 <a:solidFill>
                   <a:srgbClr val="FF0000"/>
                 </a:solidFill>
@@ -7346,10 +4509,10 @@
           </a:p>
           <a:p>
             <a:r>
-              <a:rPr lang="en-SG" dirty="0"/>
+              <a:rPr lang="en-SG" sz="2400" dirty="0"/>
               <a:t>9 set to 230400bps</a:t>
             </a:r>
-            <a:endParaRPr lang="en-US" dirty="0"/>
+            <a:endParaRPr lang="en-US" sz="2400" dirty="0"/>
           </a:p>
         </p:txBody>
       </p:sp>

</xml_diff>